<commit_message>
Add report and submission
</commit_message>
<xml_diff>
--- a/document/Report.pptx
+++ b/document/Report.pptx
@@ -2,11 +2,14 @@
 <file path=ppt/presentation.xml><?xml version="1.0" encoding="utf-8"?>
 <p:presentation xmlns:a="http://schemas.openxmlformats.org/drawingml/2006/main" xmlns:r="http://schemas.openxmlformats.org/officeDocument/2006/relationships" xmlns:p="http://schemas.openxmlformats.org/presentationml/2006/main" saveSubsetFonts="1">
   <p:sldMasterIdLst>
-    <p:sldMasterId id="2147483786" r:id="rId1"/>
+    <p:sldMasterId id="2147483822" r:id="rId1"/>
   </p:sldMasterIdLst>
   <p:sldIdLst>
     <p:sldId id="256" r:id="rId2"/>
-    <p:sldId id="257" r:id="rId3"/>
+    <p:sldId id="258" r:id="rId3"/>
+    <p:sldId id="260" r:id="rId4"/>
+    <p:sldId id="257" r:id="rId5"/>
+    <p:sldId id="259" r:id="rId6"/>
   </p:sldIdLst>
   <p:sldSz cx="12192000" cy="6858000"/>
   <p:notesSz cx="6858000" cy="9144000"/>
@@ -14,7 +17,7 @@
     <a:defPPr>
       <a:defRPr lang="en-US"/>
     </a:defPPr>
-    <a:lvl1pPr marL="0" algn="l" defTabSz="457200" rtl="0" eaLnBrk="1" latinLnBrk="0" hangingPunct="1">
+    <a:lvl1pPr marL="0" algn="l" defTabSz="914400" rtl="0" eaLnBrk="1" latinLnBrk="0" hangingPunct="1">
       <a:defRPr sz="1800" kern="1200">
         <a:solidFill>
           <a:schemeClr val="tx1"/>
@@ -24,7 +27,7 @@
         <a:cs typeface="+mn-cs"/>
       </a:defRPr>
     </a:lvl1pPr>
-    <a:lvl2pPr marL="457200" algn="l" defTabSz="457200" rtl="0" eaLnBrk="1" latinLnBrk="0" hangingPunct="1">
+    <a:lvl2pPr marL="457200" algn="l" defTabSz="914400" rtl="0" eaLnBrk="1" latinLnBrk="0" hangingPunct="1">
       <a:defRPr sz="1800" kern="1200">
         <a:solidFill>
           <a:schemeClr val="tx1"/>
@@ -34,7 +37,7 @@
         <a:cs typeface="+mn-cs"/>
       </a:defRPr>
     </a:lvl2pPr>
-    <a:lvl3pPr marL="914400" algn="l" defTabSz="457200" rtl="0" eaLnBrk="1" latinLnBrk="0" hangingPunct="1">
+    <a:lvl3pPr marL="914400" algn="l" defTabSz="914400" rtl="0" eaLnBrk="1" latinLnBrk="0" hangingPunct="1">
       <a:defRPr sz="1800" kern="1200">
         <a:solidFill>
           <a:schemeClr val="tx1"/>
@@ -44,7 +47,7 @@
         <a:cs typeface="+mn-cs"/>
       </a:defRPr>
     </a:lvl3pPr>
-    <a:lvl4pPr marL="1371600" algn="l" defTabSz="457200" rtl="0" eaLnBrk="1" latinLnBrk="0" hangingPunct="1">
+    <a:lvl4pPr marL="1371600" algn="l" defTabSz="914400" rtl="0" eaLnBrk="1" latinLnBrk="0" hangingPunct="1">
       <a:defRPr sz="1800" kern="1200">
         <a:solidFill>
           <a:schemeClr val="tx1"/>
@@ -54,7 +57,7 @@
         <a:cs typeface="+mn-cs"/>
       </a:defRPr>
     </a:lvl4pPr>
-    <a:lvl5pPr marL="1828800" algn="l" defTabSz="457200" rtl="0" eaLnBrk="1" latinLnBrk="0" hangingPunct="1">
+    <a:lvl5pPr marL="1828800" algn="l" defTabSz="914400" rtl="0" eaLnBrk="1" latinLnBrk="0" hangingPunct="1">
       <a:defRPr sz="1800" kern="1200">
         <a:solidFill>
           <a:schemeClr val="tx1"/>
@@ -64,7 +67,7 @@
         <a:cs typeface="+mn-cs"/>
       </a:defRPr>
     </a:lvl5pPr>
-    <a:lvl6pPr marL="2286000" algn="l" defTabSz="457200" rtl="0" eaLnBrk="1" latinLnBrk="0" hangingPunct="1">
+    <a:lvl6pPr marL="2286000" algn="l" defTabSz="914400" rtl="0" eaLnBrk="1" latinLnBrk="0" hangingPunct="1">
       <a:defRPr sz="1800" kern="1200">
         <a:solidFill>
           <a:schemeClr val="tx1"/>
@@ -74,7 +77,7 @@
         <a:cs typeface="+mn-cs"/>
       </a:defRPr>
     </a:lvl6pPr>
-    <a:lvl7pPr marL="2743200" algn="l" defTabSz="457200" rtl="0" eaLnBrk="1" latinLnBrk="0" hangingPunct="1">
+    <a:lvl7pPr marL="2743200" algn="l" defTabSz="914400" rtl="0" eaLnBrk="1" latinLnBrk="0" hangingPunct="1">
       <a:defRPr sz="1800" kern="1200">
         <a:solidFill>
           <a:schemeClr val="tx1"/>
@@ -84,7 +87,7 @@
         <a:cs typeface="+mn-cs"/>
       </a:defRPr>
     </a:lvl7pPr>
-    <a:lvl8pPr marL="3200400" algn="l" defTabSz="457200" rtl="0" eaLnBrk="1" latinLnBrk="0" hangingPunct="1">
+    <a:lvl8pPr marL="3200400" algn="l" defTabSz="914400" rtl="0" eaLnBrk="1" latinLnBrk="0" hangingPunct="1">
       <a:defRPr sz="1800" kern="1200">
         <a:solidFill>
           <a:schemeClr val="tx1"/>
@@ -94,7 +97,7 @@
         <a:cs typeface="+mn-cs"/>
       </a:defRPr>
     </a:lvl8pPr>
-    <a:lvl9pPr marL="3657600" algn="l" defTabSz="457200" rtl="0" eaLnBrk="1" latinLnBrk="0" hangingPunct="1">
+    <a:lvl9pPr marL="3657600" algn="l" defTabSz="914400" rtl="0" eaLnBrk="1" latinLnBrk="0" hangingPunct="1">
       <a:defRPr sz="1800" kern="1200">
         <a:solidFill>
           <a:schemeClr val="tx1"/>
@@ -114,16 +117,8 @@
 </file>
 
 <file path=ppt/slideLayouts/slideLayout1.xml><?xml version="1.0" encoding="utf-8"?>
-<p:sldLayout xmlns:a="http://schemas.openxmlformats.org/drawingml/2006/main" xmlns:r="http://schemas.openxmlformats.org/officeDocument/2006/relationships" xmlns:p="http://schemas.openxmlformats.org/presentationml/2006/main" showMasterSp="0" type="title" preserve="1">
+<p:sldLayout xmlns:a="http://schemas.openxmlformats.org/drawingml/2006/main" xmlns:r="http://schemas.openxmlformats.org/officeDocument/2006/relationships" xmlns:p="http://schemas.openxmlformats.org/presentationml/2006/main" type="title" preserve="1">
   <p:cSld name="標題投影片">
-    <p:bg>
-      <p:bgPr>
-        <a:solidFill>
-          <a:schemeClr val="bg2"/>
-        </a:solidFill>
-        <a:effectLst/>
-      </p:bgPr>
-    </p:bg>
     <p:spTree>
       <p:nvGrpSpPr>
         <p:cNvPr id="1" name=""/>
@@ -140,7 +135,13 @@
       </p:grpSpPr>
       <p:sp>
         <p:nvSpPr>
-          <p:cNvPr id="2" name="Title 1"/>
+          <p:cNvPr id="2" name="標題 1">
+            <a:extLst>
+              <a:ext uri="{FF2B5EF4-FFF2-40B4-BE49-F238E27FC236}">
+                <a16:creationId xmlns:a16="http://schemas.microsoft.com/office/drawing/2014/main" id="{2DF3F2CD-0C80-1174-1B2B-BFAB16338497}"/>
+              </a:ext>
+            </a:extLst>
+          </p:cNvPr>
           <p:cNvSpPr>
             <a:spLocks noGrp="1"/>
           </p:cNvSpPr>
@@ -150,21 +151,15 @@
         </p:nvSpPr>
         <p:spPr>
           <a:xfrm>
-            <a:off x="1915128" y="1788454"/>
-            <a:ext cx="8361229" cy="2098226"/>
+            <a:off x="1524000" y="1122363"/>
+            <a:ext cx="9144000" cy="2387600"/>
           </a:xfrm>
         </p:spPr>
         <p:txBody>
-          <a:bodyPr anchor="b">
-            <a:noAutofit/>
-          </a:bodyPr>
+          <a:bodyPr anchor="b"/>
           <a:lstStyle>
             <a:lvl1pPr algn="ctr">
-              <a:defRPr sz="7200" cap="all" baseline="0">
-                <a:solidFill>
-                  <a:schemeClr val="tx2"/>
-                </a:solidFill>
-              </a:defRPr>
+              <a:defRPr sz="6000"/>
             </a:lvl1pPr>
           </a:lstStyle>
           <a:p>
@@ -172,13 +167,19 @@
               <a:rPr lang="zh-TW" altLang="en-US"/>
               <a:t>按一下以編輯母片標題樣式</a:t>
             </a:r>
-            <a:endParaRPr lang="en-US" dirty="0"/>
-          </a:p>
-        </p:txBody>
-      </p:sp>
-      <p:sp>
-        <p:nvSpPr>
-          <p:cNvPr id="3" name="Subtitle 2"/>
+            <a:endParaRPr lang="en-US"/>
+          </a:p>
+        </p:txBody>
+      </p:sp>
+      <p:sp>
+        <p:nvSpPr>
+          <p:cNvPr id="3" name="副標題 2">
+            <a:extLst>
+              <a:ext uri="{FF2B5EF4-FFF2-40B4-BE49-F238E27FC236}">
+                <a16:creationId xmlns:a16="http://schemas.microsoft.com/office/drawing/2014/main" id="{79B365B0-8728-4CF6-5695-0F1920609865}"/>
+              </a:ext>
+            </a:extLst>
+          </p:cNvPr>
           <p:cNvSpPr>
             <a:spLocks noGrp="1"/>
           </p:cNvSpPr>
@@ -188,27 +189,16 @@
         </p:nvSpPr>
         <p:spPr>
           <a:xfrm>
-            <a:off x="2679906" y="3956279"/>
-            <a:ext cx="6831673" cy="1086237"/>
+            <a:off x="1524000" y="3602038"/>
+            <a:ext cx="9144000" cy="1655762"/>
           </a:xfrm>
         </p:spPr>
         <p:txBody>
-          <a:bodyPr>
-            <a:normAutofit/>
-          </a:bodyPr>
+          <a:bodyPr/>
           <a:lstStyle>
             <a:lvl1pPr marL="0" indent="0" algn="ctr">
-              <a:lnSpc>
-                <a:spcPct val="112000"/>
-              </a:lnSpc>
-              <a:spcBef>
-                <a:spcPts val="0"/>
-              </a:spcBef>
-              <a:spcAft>
-                <a:spcPts val="0"/>
-              </a:spcAft>
-              <a:buNone/>
-              <a:defRPr sz="2300"/>
+              <a:buNone/>
+              <a:defRPr sz="2400"/>
             </a:lvl1pPr>
             <a:lvl2pPr marL="457200" indent="0" algn="ctr">
               <a:buNone/>
@@ -248,13 +238,19 @@
               <a:rPr lang="zh-TW" altLang="en-US"/>
               <a:t>按一下以編輯母片子標題樣式</a:t>
             </a:r>
-            <a:endParaRPr lang="en-US" dirty="0"/>
-          </a:p>
-        </p:txBody>
-      </p:sp>
-      <p:sp>
-        <p:nvSpPr>
-          <p:cNvPr id="4" name="Date Placeholder 3"/>
+            <a:endParaRPr lang="en-US"/>
+          </a:p>
+        </p:txBody>
+      </p:sp>
+      <p:sp>
+        <p:nvSpPr>
+          <p:cNvPr id="4" name="日期版面配置區 3">
+            <a:extLst>
+              <a:ext uri="{FF2B5EF4-FFF2-40B4-BE49-F238E27FC236}">
+                <a16:creationId xmlns:a16="http://schemas.microsoft.com/office/drawing/2014/main" id="{BE1D7DBD-BF70-E498-6226-E21BC9EDE49F}"/>
+              </a:ext>
+            </a:extLst>
+          </p:cNvPr>
           <p:cNvSpPr>
             <a:spLocks noGrp="1"/>
           </p:cNvSpPr>
@@ -262,27 +258,14 @@
             <p:ph type="dt" sz="half" idx="10"/>
           </p:nvPr>
         </p:nvSpPr>
-        <p:spPr>
-          <a:xfrm>
-            <a:off x="752858" y="6453386"/>
-            <a:ext cx="1607944" cy="404614"/>
-          </a:xfrm>
-        </p:spPr>
-        <p:txBody>
-          <a:bodyPr/>
-          <a:lstStyle>
-            <a:lvl1pPr>
-              <a:defRPr baseline="0">
-                <a:solidFill>
-                  <a:schemeClr val="tx2"/>
-                </a:solidFill>
-              </a:defRPr>
-            </a:lvl1pPr>
-          </a:lstStyle>
+        <p:spPr/>
+        <p:txBody>
+          <a:bodyPr/>
+          <a:lstStyle/>
           <a:p>
             <a:fld id="{AE56CB72-CA00-42C8-B797-1F71B30B40C8}" type="datetimeFigureOut">
               <a:rPr lang="en-US" smtClean="0"/>
-              <a:t>6/18/2023</a:t>
+              <a:t>6/19/2023</a:t>
             </a:fld>
             <a:endParaRPr lang="en-US"/>
           </a:p>
@@ -290,7 +273,13 @@
       </p:sp>
       <p:sp>
         <p:nvSpPr>
-          <p:cNvPr id="5" name="Footer Placeholder 4"/>
+          <p:cNvPr id="5" name="頁尾版面配置區 4">
+            <a:extLst>
+              <a:ext uri="{FF2B5EF4-FFF2-40B4-BE49-F238E27FC236}">
+                <a16:creationId xmlns:a16="http://schemas.microsoft.com/office/drawing/2014/main" id="{5F06CE33-139A-AB51-E72D-62F0FABAF816}"/>
+              </a:ext>
+            </a:extLst>
+          </p:cNvPr>
           <p:cNvSpPr>
             <a:spLocks noGrp="1"/>
           </p:cNvSpPr>
@@ -298,31 +287,24 @@
             <p:ph type="ftr" sz="quarter" idx="11"/>
           </p:nvPr>
         </p:nvSpPr>
-        <p:spPr>
-          <a:xfrm>
-            <a:off x="2584054" y="6453386"/>
-            <a:ext cx="7023377" cy="404614"/>
-          </a:xfrm>
-        </p:spPr>
-        <p:txBody>
-          <a:bodyPr/>
-          <a:lstStyle>
-            <a:lvl1pPr algn="ctr">
-              <a:defRPr baseline="0">
-                <a:solidFill>
-                  <a:schemeClr val="tx2"/>
-                </a:solidFill>
-              </a:defRPr>
-            </a:lvl1pPr>
-          </a:lstStyle>
-          <a:p>
-            <a:endParaRPr lang="en-US"/>
-          </a:p>
-        </p:txBody>
-      </p:sp>
-      <p:sp>
-        <p:nvSpPr>
-          <p:cNvPr id="6" name="Slide Number Placeholder 5"/>
+        <p:spPr/>
+        <p:txBody>
+          <a:bodyPr/>
+          <a:lstStyle/>
+          <a:p>
+            <a:endParaRPr lang="en-US"/>
+          </a:p>
+        </p:txBody>
+      </p:sp>
+      <p:sp>
+        <p:nvSpPr>
+          <p:cNvPr id="6" name="投影片編號版面配置區 5">
+            <a:extLst>
+              <a:ext uri="{FF2B5EF4-FFF2-40B4-BE49-F238E27FC236}">
+                <a16:creationId xmlns:a16="http://schemas.microsoft.com/office/drawing/2014/main" id="{A3A8B596-5D74-EE9A-411E-23B4D6F70F1A}"/>
+              </a:ext>
+            </a:extLst>
+          </p:cNvPr>
           <p:cNvSpPr>
             <a:spLocks noGrp="1"/>
           </p:cNvSpPr>
@@ -330,23 +312,10 @@
             <p:ph type="sldNum" sz="quarter" idx="12"/>
           </p:nvPr>
         </p:nvSpPr>
-        <p:spPr>
-          <a:xfrm>
-            <a:off x="9830683" y="6453386"/>
-            <a:ext cx="1596292" cy="404614"/>
-          </a:xfrm>
-        </p:spPr>
-        <p:txBody>
-          <a:bodyPr/>
-          <a:lstStyle>
-            <a:lvl1pPr>
-              <a:defRPr baseline="0">
-                <a:solidFill>
-                  <a:schemeClr val="tx2"/>
-                </a:solidFill>
-              </a:defRPr>
-            </a:lvl1pPr>
-          </a:lstStyle>
+        <p:spPr/>
+        <p:txBody>
+          <a:bodyPr/>
+          <a:lstStyle/>
           <a:p>
             <a:fld id="{8F3D733B-2F1E-4CDE-9271-9DDBC48C7550}" type="slidenum">
               <a:rPr lang="en-US" smtClean="0"/>
@@ -356,144 +325,15 @@
           </a:p>
         </p:txBody>
       </p:sp>
-      <p:grpSp>
-        <p:nvGrpSpPr>
-          <p:cNvPr id="7" name="Group 6"/>
-          <p:cNvGrpSpPr/>
-          <p:nvPr/>
-        </p:nvGrpSpPr>
-        <p:grpSpPr>
-          <a:xfrm>
-            <a:off x="752858" y="744469"/>
-            <a:ext cx="10674117" cy="5349671"/>
-            <a:chOff x="752858" y="744469"/>
-            <a:chExt cx="10674117" cy="5349671"/>
-          </a:xfrm>
-        </p:grpSpPr>
-        <p:sp>
-          <p:nvSpPr>
-            <p:cNvPr id="11" name="Freeform 6"/>
-            <p:cNvSpPr/>
-            <p:nvPr/>
-          </p:nvSpPr>
-          <p:spPr bwMode="auto">
-            <a:xfrm>
-              <a:off x="8151962" y="1685652"/>
-              <a:ext cx="3275013" cy="4408488"/>
-            </a:xfrm>
-            <a:custGeom>
-              <a:avLst/>
-              <a:gdLst/>
-              <a:ahLst/>
-              <a:cxnLst/>
-              <a:rect l="l" t="t" r="r" b="b"/>
-              <a:pathLst>
-                <a:path w="10000" h="10000">
-                  <a:moveTo>
-                    <a:pt x="8761" y="0"/>
-                  </a:moveTo>
-                  <a:lnTo>
-                    <a:pt x="10000" y="0"/>
-                  </a:lnTo>
-                  <a:lnTo>
-                    <a:pt x="10000" y="10000"/>
-                  </a:lnTo>
-                  <a:lnTo>
-                    <a:pt x="0" y="10000"/>
-                  </a:lnTo>
-                  <a:lnTo>
-                    <a:pt x="0" y="9126"/>
-                  </a:lnTo>
-                  <a:lnTo>
-                    <a:pt x="8761" y="9127"/>
-                  </a:lnTo>
-                  <a:lnTo>
-                    <a:pt x="8761" y="0"/>
-                  </a:lnTo>
-                  <a:close/>
-                </a:path>
-              </a:pathLst>
-            </a:custGeom>
-            <a:solidFill>
-              <a:schemeClr val="tx2"/>
-            </a:solidFill>
-            <a:ln w="0">
-              <a:noFill/>
-              <a:prstDash val="solid"/>
-              <a:round/>
-              <a:headEnd/>
-              <a:tailEnd/>
-            </a:ln>
-          </p:spPr>
-        </p:sp>
-        <p:sp>
-          <p:nvSpPr>
-            <p:cNvPr id="14" name="Freeform 6"/>
-            <p:cNvSpPr/>
-            <p:nvPr/>
-          </p:nvSpPr>
-          <p:spPr bwMode="auto">
-            <a:xfrm flipH="1" flipV="1">
-              <a:off x="752858" y="744469"/>
-              <a:ext cx="3275668" cy="4408488"/>
-            </a:xfrm>
-            <a:custGeom>
-              <a:avLst/>
-              <a:gdLst/>
-              <a:ahLst/>
-              <a:cxnLst/>
-              <a:rect l="l" t="t" r="r" b="b"/>
-              <a:pathLst>
-                <a:path w="10002" h="10000">
-                  <a:moveTo>
-                    <a:pt x="8763" y="0"/>
-                  </a:moveTo>
-                  <a:lnTo>
-                    <a:pt x="10002" y="0"/>
-                  </a:lnTo>
-                  <a:lnTo>
-                    <a:pt x="10002" y="10000"/>
-                  </a:lnTo>
-                  <a:lnTo>
-                    <a:pt x="2" y="10000"/>
-                  </a:lnTo>
-                  <a:cubicBezTo>
-                    <a:pt x="-2" y="9698"/>
-                    <a:pt x="4" y="9427"/>
-                    <a:pt x="0" y="9125"/>
-                  </a:cubicBezTo>
-                  <a:lnTo>
-                    <a:pt x="8763" y="9128"/>
-                  </a:lnTo>
-                  <a:lnTo>
-                    <a:pt x="8763" y="0"/>
-                  </a:lnTo>
-                  <a:close/>
-                </a:path>
-              </a:pathLst>
-            </a:custGeom>
-            <a:solidFill>
-              <a:schemeClr val="tx2"/>
-            </a:solidFill>
-            <a:ln w="0">
-              <a:noFill/>
-              <a:prstDash val="solid"/>
-              <a:round/>
-              <a:headEnd/>
-              <a:tailEnd/>
-            </a:ln>
-          </p:spPr>
-        </p:sp>
-      </p:grpSp>
     </p:spTree>
     <p:extLst>
       <p:ext uri="{BB962C8B-B14F-4D97-AF65-F5344CB8AC3E}">
-        <p14:creationId xmlns:p14="http://schemas.microsoft.com/office/powerpoint/2010/main" val="3984121321"/>
+        <p14:creationId xmlns:p14="http://schemas.microsoft.com/office/powerpoint/2010/main" val="278929070"/>
       </p:ext>
     </p:extLst>
   </p:cSld>
   <p:clrMapOvr>
-    <a:overrideClrMapping bg1="lt1" tx1="dk1" bg2="lt2" tx2="dk2" accent1="accent1" accent2="accent2" accent3="accent3" accent4="accent4" accent5="accent5" accent6="accent6" hlink="hlink" folHlink="folHlink"/>
+    <a:masterClrMapping/>
   </p:clrMapOvr>
 </p:sldLayout>
 </file>
@@ -517,7 +357,13 @@
       </p:grpSpPr>
       <p:sp>
         <p:nvSpPr>
-          <p:cNvPr id="2" name="Title 1"/>
+          <p:cNvPr id="2" name="標題 1">
+            <a:extLst>
+              <a:ext uri="{FF2B5EF4-FFF2-40B4-BE49-F238E27FC236}">
+                <a16:creationId xmlns:a16="http://schemas.microsoft.com/office/drawing/2014/main" id="{6838E645-FF32-1F85-FBCD-46F953BE2AAA}"/>
+              </a:ext>
+            </a:extLst>
+          </p:cNvPr>
           <p:cNvSpPr>
             <a:spLocks noGrp="1"/>
           </p:cNvSpPr>
@@ -534,13 +380,19 @@
               <a:rPr lang="zh-TW" altLang="en-US"/>
               <a:t>按一下以編輯母片標題樣式</a:t>
             </a:r>
-            <a:endParaRPr lang="en-US" dirty="0"/>
-          </a:p>
-        </p:txBody>
-      </p:sp>
-      <p:sp>
-        <p:nvSpPr>
-          <p:cNvPr id="3" name="Vertical Text Placeholder 2"/>
+            <a:endParaRPr lang="en-US"/>
+          </a:p>
+        </p:txBody>
+      </p:sp>
+      <p:sp>
+        <p:nvSpPr>
+          <p:cNvPr id="3" name="直排文字版面配置區 2">
+            <a:extLst>
+              <a:ext uri="{FF2B5EF4-FFF2-40B4-BE49-F238E27FC236}">
+                <a16:creationId xmlns:a16="http://schemas.microsoft.com/office/drawing/2014/main" id="{C0ADD017-A7BF-026C-1BDF-CBF07DEF478C}"/>
+              </a:ext>
+            </a:extLst>
+          </p:cNvPr>
           <p:cNvSpPr>
             <a:spLocks noGrp="1"/>
           </p:cNvSpPr>
@@ -548,12 +400,7 @@
             <p:ph type="body" orient="vert" idx="1"/>
           </p:nvPr>
         </p:nvSpPr>
-        <p:spPr>
-          <a:xfrm>
-            <a:off x="1371600" y="2295525"/>
-            <a:ext cx="9601200" cy="3571875"/>
-          </a:xfrm>
-        </p:spPr>
+        <p:spPr/>
         <p:txBody>
           <a:bodyPr vert="eaVert"/>
           <a:lstStyle/>
@@ -591,13 +438,19 @@
               <a:rPr lang="zh-TW" altLang="en-US"/>
               <a:t>第五層</a:t>
             </a:r>
-            <a:endParaRPr lang="en-US" dirty="0"/>
-          </a:p>
-        </p:txBody>
-      </p:sp>
-      <p:sp>
-        <p:nvSpPr>
-          <p:cNvPr id="4" name="Date Placeholder 3"/>
+            <a:endParaRPr lang="en-US"/>
+          </a:p>
+        </p:txBody>
+      </p:sp>
+      <p:sp>
+        <p:nvSpPr>
+          <p:cNvPr id="4" name="日期版面配置區 3">
+            <a:extLst>
+              <a:ext uri="{FF2B5EF4-FFF2-40B4-BE49-F238E27FC236}">
+                <a16:creationId xmlns:a16="http://schemas.microsoft.com/office/drawing/2014/main" id="{63831D05-2BDD-DDE7-C8D0-A550378FC81D}"/>
+              </a:ext>
+            </a:extLst>
+          </p:cNvPr>
           <p:cNvSpPr>
             <a:spLocks noGrp="1"/>
           </p:cNvSpPr>
@@ -612,7 +465,7 @@
           <a:p>
             <a:fld id="{AE56CB72-CA00-42C8-B797-1F71B30B40C8}" type="datetimeFigureOut">
               <a:rPr lang="en-US" smtClean="0"/>
-              <a:t>6/18/2023</a:t>
+              <a:t>6/19/2023</a:t>
             </a:fld>
             <a:endParaRPr lang="en-US"/>
           </a:p>
@@ -620,7 +473,13 @@
       </p:sp>
       <p:sp>
         <p:nvSpPr>
-          <p:cNvPr id="5" name="Footer Placeholder 4"/>
+          <p:cNvPr id="5" name="頁尾版面配置區 4">
+            <a:extLst>
+              <a:ext uri="{FF2B5EF4-FFF2-40B4-BE49-F238E27FC236}">
+                <a16:creationId xmlns:a16="http://schemas.microsoft.com/office/drawing/2014/main" id="{122C6D72-99BB-A5A6-E0E6-4E804CC20B4E}"/>
+              </a:ext>
+            </a:extLst>
+          </p:cNvPr>
           <p:cNvSpPr>
             <a:spLocks noGrp="1"/>
           </p:cNvSpPr>
@@ -639,7 +498,13 @@
       </p:sp>
       <p:sp>
         <p:nvSpPr>
-          <p:cNvPr id="6" name="Slide Number Placeholder 5"/>
+          <p:cNvPr id="6" name="投影片編號版面配置區 5">
+            <a:extLst>
+              <a:ext uri="{FF2B5EF4-FFF2-40B4-BE49-F238E27FC236}">
+                <a16:creationId xmlns:a16="http://schemas.microsoft.com/office/drawing/2014/main" id="{AAB383E6-D4F3-1F09-2CF3-281C908690A7}"/>
+              </a:ext>
+            </a:extLst>
+          </p:cNvPr>
           <p:cNvSpPr>
             <a:spLocks noGrp="1"/>
           </p:cNvSpPr>
@@ -663,7 +528,7 @@
     </p:spTree>
     <p:extLst>
       <p:ext uri="{BB962C8B-B14F-4D97-AF65-F5344CB8AC3E}">
-        <p14:creationId xmlns:p14="http://schemas.microsoft.com/office/powerpoint/2010/main" val="4063434057"/>
+        <p14:creationId xmlns:p14="http://schemas.microsoft.com/office/powerpoint/2010/main" val="3196751139"/>
       </p:ext>
     </p:extLst>
   </p:cSld>
@@ -692,7 +557,13 @@
       </p:grpSpPr>
       <p:sp>
         <p:nvSpPr>
-          <p:cNvPr id="2" name="Vertical Title 1"/>
+          <p:cNvPr id="2" name="直排標題 1">
+            <a:extLst>
+              <a:ext uri="{FF2B5EF4-FFF2-40B4-BE49-F238E27FC236}">
+                <a16:creationId xmlns:a16="http://schemas.microsoft.com/office/drawing/2014/main" id="{2D17A3D8-77CD-ECBB-E693-47BD91E3903B}"/>
+              </a:ext>
+            </a:extLst>
+          </p:cNvPr>
           <p:cNvSpPr>
             <a:spLocks noGrp="1"/>
           </p:cNvSpPr>
@@ -702,8 +573,8 @@
         </p:nvSpPr>
         <p:spPr>
           <a:xfrm>
-            <a:off x="9596561" y="624156"/>
-            <a:ext cx="1565766" cy="5243244"/>
+            <a:off x="8724900" y="365125"/>
+            <a:ext cx="2628900" cy="5811838"/>
           </a:xfrm>
         </p:spPr>
         <p:txBody>
@@ -714,13 +585,19 @@
               <a:rPr lang="zh-TW" altLang="en-US"/>
               <a:t>按一下以編輯母片標題樣式</a:t>
             </a:r>
-            <a:endParaRPr lang="en-US" dirty="0"/>
-          </a:p>
-        </p:txBody>
-      </p:sp>
-      <p:sp>
-        <p:nvSpPr>
-          <p:cNvPr id="3" name="Vertical Text Placeholder 2"/>
+            <a:endParaRPr lang="en-US"/>
+          </a:p>
+        </p:txBody>
+      </p:sp>
+      <p:sp>
+        <p:nvSpPr>
+          <p:cNvPr id="3" name="直排文字版面配置區 2">
+            <a:extLst>
+              <a:ext uri="{FF2B5EF4-FFF2-40B4-BE49-F238E27FC236}">
+                <a16:creationId xmlns:a16="http://schemas.microsoft.com/office/drawing/2014/main" id="{B1304CA1-7A61-5C16-1F8E-2BD1EA4CB0E5}"/>
+              </a:ext>
+            </a:extLst>
+          </p:cNvPr>
           <p:cNvSpPr>
             <a:spLocks noGrp="1"/>
           </p:cNvSpPr>
@@ -730,8 +607,8 @@
         </p:nvSpPr>
         <p:spPr>
           <a:xfrm>
-            <a:off x="1371600" y="624156"/>
-            <a:ext cx="8179641" cy="5243244"/>
+            <a:off x="838200" y="365125"/>
+            <a:ext cx="7734300" cy="5811838"/>
           </a:xfrm>
         </p:spPr>
         <p:txBody>
@@ -771,13 +648,19 @@
               <a:rPr lang="zh-TW" altLang="en-US"/>
               <a:t>第五層</a:t>
             </a:r>
-            <a:endParaRPr lang="en-US" dirty="0"/>
-          </a:p>
-        </p:txBody>
-      </p:sp>
-      <p:sp>
-        <p:nvSpPr>
-          <p:cNvPr id="4" name="Date Placeholder 3"/>
+            <a:endParaRPr lang="en-US"/>
+          </a:p>
+        </p:txBody>
+      </p:sp>
+      <p:sp>
+        <p:nvSpPr>
+          <p:cNvPr id="4" name="日期版面配置區 3">
+            <a:extLst>
+              <a:ext uri="{FF2B5EF4-FFF2-40B4-BE49-F238E27FC236}">
+                <a16:creationId xmlns:a16="http://schemas.microsoft.com/office/drawing/2014/main" id="{9B3F82EC-F183-8FC8-A6FA-53CBB195772E}"/>
+              </a:ext>
+            </a:extLst>
+          </p:cNvPr>
           <p:cNvSpPr>
             <a:spLocks noGrp="1"/>
           </p:cNvSpPr>
@@ -792,7 +675,7 @@
           <a:p>
             <a:fld id="{AE56CB72-CA00-42C8-B797-1F71B30B40C8}" type="datetimeFigureOut">
               <a:rPr lang="en-US" smtClean="0"/>
-              <a:t>6/18/2023</a:t>
+              <a:t>6/19/2023</a:t>
             </a:fld>
             <a:endParaRPr lang="en-US"/>
           </a:p>
@@ -800,7 +683,13 @@
       </p:sp>
       <p:sp>
         <p:nvSpPr>
-          <p:cNvPr id="5" name="Footer Placeholder 4"/>
+          <p:cNvPr id="5" name="頁尾版面配置區 4">
+            <a:extLst>
+              <a:ext uri="{FF2B5EF4-FFF2-40B4-BE49-F238E27FC236}">
+                <a16:creationId xmlns:a16="http://schemas.microsoft.com/office/drawing/2014/main" id="{144B2CB3-60DD-E7CD-EDCB-91FBB4B80686}"/>
+              </a:ext>
+            </a:extLst>
+          </p:cNvPr>
           <p:cNvSpPr>
             <a:spLocks noGrp="1"/>
           </p:cNvSpPr>
@@ -819,7 +708,13 @@
       </p:sp>
       <p:sp>
         <p:nvSpPr>
-          <p:cNvPr id="6" name="Slide Number Placeholder 5"/>
+          <p:cNvPr id="6" name="投影片編號版面配置區 5">
+            <a:extLst>
+              <a:ext uri="{FF2B5EF4-FFF2-40B4-BE49-F238E27FC236}">
+                <a16:creationId xmlns:a16="http://schemas.microsoft.com/office/drawing/2014/main" id="{05ADD3D0-F509-21FD-1872-3C7011D91BCE}"/>
+              </a:ext>
+            </a:extLst>
+          </p:cNvPr>
           <p:cNvSpPr>
             <a:spLocks noGrp="1"/>
           </p:cNvSpPr>
@@ -843,7 +738,7 @@
     </p:spTree>
     <p:extLst>
       <p:ext uri="{BB962C8B-B14F-4D97-AF65-F5344CB8AC3E}">
-        <p14:creationId xmlns:p14="http://schemas.microsoft.com/office/powerpoint/2010/main" val="398386932"/>
+        <p14:creationId xmlns:p14="http://schemas.microsoft.com/office/powerpoint/2010/main" val="4269583996"/>
       </p:ext>
     </p:extLst>
   </p:cSld>
@@ -872,7 +767,13 @@
       </p:grpSpPr>
       <p:sp>
         <p:nvSpPr>
-          <p:cNvPr id="2" name="Title 1"/>
+          <p:cNvPr id="2" name="標題 1">
+            <a:extLst>
+              <a:ext uri="{FF2B5EF4-FFF2-40B4-BE49-F238E27FC236}">
+                <a16:creationId xmlns:a16="http://schemas.microsoft.com/office/drawing/2014/main" id="{1DA80DBF-329E-CB45-15D1-6622F16EB956}"/>
+              </a:ext>
+            </a:extLst>
+          </p:cNvPr>
           <p:cNvSpPr>
             <a:spLocks noGrp="1"/>
           </p:cNvSpPr>
@@ -889,13 +790,19 @@
               <a:rPr lang="zh-TW" altLang="en-US"/>
               <a:t>按一下以編輯母片標題樣式</a:t>
             </a:r>
-            <a:endParaRPr lang="en-US" dirty="0"/>
-          </a:p>
-        </p:txBody>
-      </p:sp>
-      <p:sp>
-        <p:nvSpPr>
-          <p:cNvPr id="3" name="Content Placeholder 2"/>
+            <a:endParaRPr lang="en-US"/>
+          </a:p>
+        </p:txBody>
+      </p:sp>
+      <p:sp>
+        <p:nvSpPr>
+          <p:cNvPr id="3" name="內容版面配置區 2">
+            <a:extLst>
+              <a:ext uri="{FF2B5EF4-FFF2-40B4-BE49-F238E27FC236}">
+                <a16:creationId xmlns:a16="http://schemas.microsoft.com/office/drawing/2014/main" id="{7042213D-E780-4B72-9DC9-FCEC98C7D6A8}"/>
+              </a:ext>
+            </a:extLst>
+          </p:cNvPr>
           <p:cNvSpPr>
             <a:spLocks noGrp="1"/>
           </p:cNvSpPr>
@@ -941,13 +848,19 @@
               <a:rPr lang="zh-TW" altLang="en-US"/>
               <a:t>第五層</a:t>
             </a:r>
-            <a:endParaRPr lang="en-US" dirty="0"/>
-          </a:p>
-        </p:txBody>
-      </p:sp>
-      <p:sp>
-        <p:nvSpPr>
-          <p:cNvPr id="4" name="Date Placeholder 3"/>
+            <a:endParaRPr lang="en-US"/>
+          </a:p>
+        </p:txBody>
+      </p:sp>
+      <p:sp>
+        <p:nvSpPr>
+          <p:cNvPr id="4" name="日期版面配置區 3">
+            <a:extLst>
+              <a:ext uri="{FF2B5EF4-FFF2-40B4-BE49-F238E27FC236}">
+                <a16:creationId xmlns:a16="http://schemas.microsoft.com/office/drawing/2014/main" id="{6DC079B7-2035-A820-07DD-50C09D42136E}"/>
+              </a:ext>
+            </a:extLst>
+          </p:cNvPr>
           <p:cNvSpPr>
             <a:spLocks noGrp="1"/>
           </p:cNvSpPr>
@@ -962,7 +875,7 @@
           <a:p>
             <a:fld id="{AE56CB72-CA00-42C8-B797-1F71B30B40C8}" type="datetimeFigureOut">
               <a:rPr lang="en-US" smtClean="0"/>
-              <a:t>6/18/2023</a:t>
+              <a:t>6/19/2023</a:t>
             </a:fld>
             <a:endParaRPr lang="en-US"/>
           </a:p>
@@ -970,7 +883,13 @@
       </p:sp>
       <p:sp>
         <p:nvSpPr>
-          <p:cNvPr id="5" name="Footer Placeholder 4"/>
+          <p:cNvPr id="5" name="頁尾版面配置區 4">
+            <a:extLst>
+              <a:ext uri="{FF2B5EF4-FFF2-40B4-BE49-F238E27FC236}">
+                <a16:creationId xmlns:a16="http://schemas.microsoft.com/office/drawing/2014/main" id="{83A244B9-7310-E9D8-4673-90907F1A1575}"/>
+              </a:ext>
+            </a:extLst>
+          </p:cNvPr>
           <p:cNvSpPr>
             <a:spLocks noGrp="1"/>
           </p:cNvSpPr>
@@ -989,7 +908,13 @@
       </p:sp>
       <p:sp>
         <p:nvSpPr>
-          <p:cNvPr id="6" name="Slide Number Placeholder 5"/>
+          <p:cNvPr id="6" name="投影片編號版面配置區 5">
+            <a:extLst>
+              <a:ext uri="{FF2B5EF4-FFF2-40B4-BE49-F238E27FC236}">
+                <a16:creationId xmlns:a16="http://schemas.microsoft.com/office/drawing/2014/main" id="{8B7F4D59-CB43-BBF4-7658-BC5BA55A2738}"/>
+              </a:ext>
+            </a:extLst>
+          </p:cNvPr>
           <p:cNvSpPr>
             <a:spLocks noGrp="1"/>
           </p:cNvSpPr>
@@ -1013,7 +938,7 @@
     </p:spTree>
     <p:extLst>
       <p:ext uri="{BB962C8B-B14F-4D97-AF65-F5344CB8AC3E}">
-        <p14:creationId xmlns:p14="http://schemas.microsoft.com/office/powerpoint/2010/main" val="1658865302"/>
+        <p14:creationId xmlns:p14="http://schemas.microsoft.com/office/powerpoint/2010/main" val="832173294"/>
       </p:ext>
     </p:extLst>
   </p:cSld>
@@ -1024,13 +949,8 @@
 </file>
 
 <file path=ppt/slideLayouts/slideLayout3.xml><?xml version="1.0" encoding="utf-8"?>
-<p:sldLayout xmlns:a="http://schemas.openxmlformats.org/drawingml/2006/main" xmlns:r="http://schemas.openxmlformats.org/officeDocument/2006/relationships" xmlns:p="http://schemas.openxmlformats.org/presentationml/2006/main" showMasterSp="0" type="secHead" preserve="1">
+<p:sldLayout xmlns:a="http://schemas.openxmlformats.org/drawingml/2006/main" xmlns:r="http://schemas.openxmlformats.org/officeDocument/2006/relationships" xmlns:p="http://schemas.openxmlformats.org/presentationml/2006/main" type="secHead" preserve="1">
   <p:cSld name="章節標題">
-    <p:bg>
-      <p:bgRef idx="1001">
-        <a:schemeClr val="bg2"/>
-      </p:bgRef>
-    </p:bg>
     <p:spTree>
       <p:nvGrpSpPr>
         <p:cNvPr id="1" name=""/>
@@ -1047,7 +967,13 @@
       </p:grpSpPr>
       <p:sp>
         <p:nvSpPr>
-          <p:cNvPr id="2" name="Title 1"/>
+          <p:cNvPr id="2" name="標題 1">
+            <a:extLst>
+              <a:ext uri="{FF2B5EF4-FFF2-40B4-BE49-F238E27FC236}">
+                <a16:creationId xmlns:a16="http://schemas.microsoft.com/office/drawing/2014/main" id="{0ABD8A1E-E87C-C74C-BE18-0C04B021ADA1}"/>
+              </a:ext>
+            </a:extLst>
+          </p:cNvPr>
           <p:cNvSpPr>
             <a:spLocks noGrp="1"/>
           </p:cNvSpPr>
@@ -1057,21 +983,15 @@
         </p:nvSpPr>
         <p:spPr>
           <a:xfrm>
-            <a:off x="765025" y="1301360"/>
-            <a:ext cx="9612971" cy="2852737"/>
+            <a:off x="831850" y="1709738"/>
+            <a:ext cx="10515600" cy="2852737"/>
           </a:xfrm>
         </p:spPr>
         <p:txBody>
-          <a:bodyPr anchor="b">
-            <a:normAutofit/>
-          </a:bodyPr>
+          <a:bodyPr anchor="b"/>
           <a:lstStyle>
-            <a:lvl1pPr algn="r">
-              <a:defRPr sz="7200" cap="all" baseline="0">
-                <a:solidFill>
-                  <a:schemeClr val="tx2"/>
-                </a:solidFill>
-              </a:defRPr>
+            <a:lvl1pPr>
+              <a:defRPr sz="6000"/>
             </a:lvl1pPr>
           </a:lstStyle>
           <a:p>
@@ -1079,13 +999,19 @@
               <a:rPr lang="zh-TW" altLang="en-US"/>
               <a:t>按一下以編輯母片標題樣式</a:t>
             </a:r>
-            <a:endParaRPr lang="en-US" dirty="0"/>
-          </a:p>
-        </p:txBody>
-      </p:sp>
-      <p:sp>
-        <p:nvSpPr>
-          <p:cNvPr id="3" name="Text Placeholder 2"/>
+            <a:endParaRPr lang="en-US"/>
+          </a:p>
+        </p:txBody>
+      </p:sp>
+      <p:sp>
+        <p:nvSpPr>
+          <p:cNvPr id="3" name="文字版面配置區 2">
+            <a:extLst>
+              <a:ext uri="{FF2B5EF4-FFF2-40B4-BE49-F238E27FC236}">
+                <a16:creationId xmlns:a16="http://schemas.microsoft.com/office/drawing/2014/main" id="{069EE4B6-B6D3-5124-E6AC-152052C11278}"/>
+              </a:ext>
+            </a:extLst>
+          </p:cNvPr>
           <p:cNvSpPr>
             <a:spLocks noGrp="1"/>
           </p:cNvSpPr>
@@ -1095,27 +1021,20 @@
         </p:nvSpPr>
         <p:spPr>
           <a:xfrm>
-            <a:off x="765025" y="4216328"/>
-            <a:ext cx="9612971" cy="1143324"/>
+            <a:off x="831850" y="4589463"/>
+            <a:ext cx="10515600" cy="1500187"/>
           </a:xfrm>
         </p:spPr>
         <p:txBody>
           <a:bodyPr/>
           <a:lstStyle>
-            <a:lvl1pPr marL="0" indent="0" algn="r">
-              <a:lnSpc>
-                <a:spcPct val="112000"/>
-              </a:lnSpc>
-              <a:spcBef>
-                <a:spcPts val="0"/>
-              </a:spcBef>
-              <a:spcAft>
-                <a:spcPts val="0"/>
-              </a:spcAft>
+            <a:lvl1pPr marL="0" indent="0">
               <a:buNone/>
               <a:defRPr sz="2400">
                 <a:solidFill>
-                  <a:schemeClr val="tx2"/>
+                  <a:schemeClr val="tx1">
+                    <a:tint val="75000"/>
+                  </a:schemeClr>
                 </a:solidFill>
               </a:defRPr>
             </a:lvl1pPr>
@@ -1211,7 +1130,13 @@
       </p:sp>
       <p:sp>
         <p:nvSpPr>
-          <p:cNvPr id="4" name="Date Placeholder 3"/>
+          <p:cNvPr id="4" name="日期版面配置區 3">
+            <a:extLst>
+              <a:ext uri="{FF2B5EF4-FFF2-40B4-BE49-F238E27FC236}">
+                <a16:creationId xmlns:a16="http://schemas.microsoft.com/office/drawing/2014/main" id="{125BE276-7C74-10E7-BDC5-0B5151BE8052}"/>
+              </a:ext>
+            </a:extLst>
+          </p:cNvPr>
           <p:cNvSpPr>
             <a:spLocks noGrp="1"/>
           </p:cNvSpPr>
@@ -1219,27 +1144,14 @@
             <p:ph type="dt" sz="half" idx="10"/>
           </p:nvPr>
         </p:nvSpPr>
-        <p:spPr>
-          <a:xfrm>
-            <a:off x="738908" y="6453386"/>
-            <a:ext cx="1622409" cy="404614"/>
-          </a:xfrm>
-        </p:spPr>
-        <p:txBody>
-          <a:bodyPr/>
-          <a:lstStyle>
-            <a:lvl1pPr>
-              <a:defRPr>
-                <a:solidFill>
-                  <a:schemeClr val="tx2"/>
-                </a:solidFill>
-              </a:defRPr>
-            </a:lvl1pPr>
-          </a:lstStyle>
+        <p:spPr/>
+        <p:txBody>
+          <a:bodyPr/>
+          <a:lstStyle/>
           <a:p>
             <a:fld id="{AE56CB72-CA00-42C8-B797-1F71B30B40C8}" type="datetimeFigureOut">
               <a:rPr lang="en-US" smtClean="0"/>
-              <a:t>6/18/2023</a:t>
+              <a:t>6/19/2023</a:t>
             </a:fld>
             <a:endParaRPr lang="en-US"/>
           </a:p>
@@ -1247,7 +1159,13 @@
       </p:sp>
       <p:sp>
         <p:nvSpPr>
-          <p:cNvPr id="5" name="Footer Placeholder 4"/>
+          <p:cNvPr id="5" name="頁尾版面配置區 4">
+            <a:extLst>
+              <a:ext uri="{FF2B5EF4-FFF2-40B4-BE49-F238E27FC236}">
+                <a16:creationId xmlns:a16="http://schemas.microsoft.com/office/drawing/2014/main" id="{8B94D76C-A3C6-8DB5-10CB-6382E2968947}"/>
+              </a:ext>
+            </a:extLst>
+          </p:cNvPr>
           <p:cNvSpPr>
             <a:spLocks noGrp="1"/>
           </p:cNvSpPr>
@@ -1255,31 +1173,24 @@
             <p:ph type="ftr" sz="quarter" idx="11"/>
           </p:nvPr>
         </p:nvSpPr>
-        <p:spPr>
-          <a:xfrm>
-            <a:off x="2584312" y="6453386"/>
-            <a:ext cx="7023377" cy="404614"/>
-          </a:xfrm>
-        </p:spPr>
-        <p:txBody>
-          <a:bodyPr/>
-          <a:lstStyle>
-            <a:lvl1pPr algn="ctr">
-              <a:defRPr>
-                <a:solidFill>
-                  <a:schemeClr val="tx2"/>
-                </a:solidFill>
-              </a:defRPr>
-            </a:lvl1pPr>
-          </a:lstStyle>
-          <a:p>
-            <a:endParaRPr lang="en-US"/>
-          </a:p>
-        </p:txBody>
-      </p:sp>
-      <p:sp>
-        <p:nvSpPr>
-          <p:cNvPr id="6" name="Slide Number Placeholder 5"/>
+        <p:spPr/>
+        <p:txBody>
+          <a:bodyPr/>
+          <a:lstStyle/>
+          <a:p>
+            <a:endParaRPr lang="en-US"/>
+          </a:p>
+        </p:txBody>
+      </p:sp>
+      <p:sp>
+        <p:nvSpPr>
+          <p:cNvPr id="6" name="投影片編號版面配置區 5">
+            <a:extLst>
+              <a:ext uri="{FF2B5EF4-FFF2-40B4-BE49-F238E27FC236}">
+                <a16:creationId xmlns:a16="http://schemas.microsoft.com/office/drawing/2014/main" id="{AD6DC772-8A1D-1147-585B-1198E2150F35}"/>
+              </a:ext>
+            </a:extLst>
+          </p:cNvPr>
           <p:cNvSpPr>
             <a:spLocks noGrp="1"/>
           </p:cNvSpPr>
@@ -1287,23 +1198,10 @@
             <p:ph type="sldNum" sz="quarter" idx="12"/>
           </p:nvPr>
         </p:nvSpPr>
-        <p:spPr>
-          <a:xfrm>
-            <a:off x="9830683" y="6453386"/>
-            <a:ext cx="1596292" cy="404614"/>
-          </a:xfrm>
-        </p:spPr>
-        <p:txBody>
-          <a:bodyPr/>
-          <a:lstStyle>
-            <a:lvl1pPr>
-              <a:defRPr>
-                <a:solidFill>
-                  <a:schemeClr val="tx2"/>
-                </a:solidFill>
-              </a:defRPr>
-            </a:lvl1pPr>
-          </a:lstStyle>
+        <p:spPr/>
+        <p:txBody>
+          <a:bodyPr/>
+          <a:lstStyle/>
           <a:p>
             <a:fld id="{8F3D733B-2F1E-4CDE-9271-9DDBC48C7550}" type="slidenum">
               <a:rPr lang="en-US" smtClean="0"/>
@@ -1313,71 +1211,15 @@
           </a:p>
         </p:txBody>
       </p:sp>
-      <p:sp>
-        <p:nvSpPr>
-          <p:cNvPr id="7" name="Freeform 6" title="Crop Mark"/>
-          <p:cNvSpPr/>
-          <p:nvPr/>
-        </p:nvSpPr>
-        <p:spPr bwMode="auto">
-          <a:xfrm>
-            <a:off x="8151962" y="1685652"/>
-            <a:ext cx="3275013" cy="4408488"/>
-          </a:xfrm>
-          <a:custGeom>
-            <a:avLst/>
-            <a:gdLst/>
-            <a:ahLst/>
-            <a:cxnLst/>
-            <a:rect l="0" t="0" r="r" b="b"/>
-            <a:pathLst>
-              <a:path w="4125" h="5554">
-                <a:moveTo>
-                  <a:pt x="3614" y="0"/>
-                </a:moveTo>
-                <a:lnTo>
-                  <a:pt x="4125" y="0"/>
-                </a:lnTo>
-                <a:lnTo>
-                  <a:pt x="4125" y="5554"/>
-                </a:lnTo>
-                <a:lnTo>
-                  <a:pt x="0" y="5554"/>
-                </a:lnTo>
-                <a:lnTo>
-                  <a:pt x="0" y="5074"/>
-                </a:lnTo>
-                <a:lnTo>
-                  <a:pt x="3614" y="5074"/>
-                </a:lnTo>
-                <a:lnTo>
-                  <a:pt x="3614" y="0"/>
-                </a:lnTo>
-                <a:close/>
-              </a:path>
-            </a:pathLst>
-          </a:custGeom>
-          <a:solidFill>
-            <a:schemeClr val="tx2"/>
-          </a:solidFill>
-          <a:ln w="0">
-            <a:noFill/>
-            <a:prstDash val="solid"/>
-            <a:round/>
-            <a:headEnd/>
-            <a:tailEnd/>
-          </a:ln>
-        </p:spPr>
-      </p:sp>
     </p:spTree>
     <p:extLst>
       <p:ext uri="{BB962C8B-B14F-4D97-AF65-F5344CB8AC3E}">
-        <p14:creationId xmlns:p14="http://schemas.microsoft.com/office/powerpoint/2010/main" val="72515472"/>
+        <p14:creationId xmlns:p14="http://schemas.microsoft.com/office/powerpoint/2010/main" val="390407152"/>
       </p:ext>
     </p:extLst>
   </p:cSld>
   <p:clrMapOvr>
-    <a:overrideClrMapping bg1="dk1" tx1="lt1" bg2="dk2" tx2="lt2" accent1="accent1" accent2="accent2" accent3="accent3" accent4="accent4" accent5="accent5" accent6="accent6" hlink="hlink" folHlink="folHlink"/>
+    <a:masterClrMapping/>
   </p:clrMapOvr>
 </p:sldLayout>
 </file>
@@ -1401,7 +1243,13 @@
       </p:grpSpPr>
       <p:sp>
         <p:nvSpPr>
-          <p:cNvPr id="2" name="Title 1"/>
+          <p:cNvPr id="2" name="標題 1">
+            <a:extLst>
+              <a:ext uri="{FF2B5EF4-FFF2-40B4-BE49-F238E27FC236}">
+                <a16:creationId xmlns:a16="http://schemas.microsoft.com/office/drawing/2014/main" id="{229B4245-8C5F-323B-4749-02BE574A9AB3}"/>
+              </a:ext>
+            </a:extLst>
+          </p:cNvPr>
           <p:cNvSpPr>
             <a:spLocks noGrp="1"/>
           </p:cNvSpPr>
@@ -1412,27 +1260,25 @@
         <p:spPr/>
         <p:txBody>
           <a:bodyPr/>
-          <a:lstStyle>
-            <a:lvl1pPr>
-              <a:defRPr>
-                <a:solidFill>
-                  <a:schemeClr val="tx2"/>
-                </a:solidFill>
-              </a:defRPr>
-            </a:lvl1pPr>
-          </a:lstStyle>
+          <a:lstStyle/>
           <a:p>
             <a:r>
               <a:rPr lang="zh-TW" altLang="en-US"/>
               <a:t>按一下以編輯母片標題樣式</a:t>
             </a:r>
-            <a:endParaRPr lang="en-US" dirty="0"/>
-          </a:p>
-        </p:txBody>
-      </p:sp>
-      <p:sp>
-        <p:nvSpPr>
-          <p:cNvPr id="3" name="Content Placeholder 2"/>
+            <a:endParaRPr lang="en-US"/>
+          </a:p>
+        </p:txBody>
+      </p:sp>
+      <p:sp>
+        <p:nvSpPr>
+          <p:cNvPr id="3" name="內容版面配置區 2">
+            <a:extLst>
+              <a:ext uri="{FF2B5EF4-FFF2-40B4-BE49-F238E27FC236}">
+                <a16:creationId xmlns:a16="http://schemas.microsoft.com/office/drawing/2014/main" id="{094172DB-0D89-2868-76E7-9AB85E14E17C}"/>
+              </a:ext>
+            </a:extLst>
+          </p:cNvPr>
           <p:cNvSpPr>
             <a:spLocks noGrp="1"/>
           </p:cNvSpPr>
@@ -1442,49 +1288,13 @@
         </p:nvSpPr>
         <p:spPr>
           <a:xfrm>
-            <a:off x="1371600" y="2285999"/>
-            <a:ext cx="4447786" cy="3581401"/>
+            <a:off x="838200" y="1825625"/>
+            <a:ext cx="5181600" cy="4351338"/>
           </a:xfrm>
         </p:spPr>
         <p:txBody>
           <a:bodyPr/>
-          <a:lstStyle>
-            <a:lvl1pPr>
-              <a:defRPr baseline="0">
-                <a:solidFill>
-                  <a:schemeClr val="tx2"/>
-                </a:solidFill>
-              </a:defRPr>
-            </a:lvl1pPr>
-            <a:lvl2pPr>
-              <a:defRPr baseline="0">
-                <a:solidFill>
-                  <a:schemeClr val="tx2"/>
-                </a:solidFill>
-              </a:defRPr>
-            </a:lvl2pPr>
-            <a:lvl3pPr>
-              <a:defRPr baseline="0">
-                <a:solidFill>
-                  <a:schemeClr val="tx2"/>
-                </a:solidFill>
-              </a:defRPr>
-            </a:lvl3pPr>
-            <a:lvl4pPr>
-              <a:defRPr baseline="0">
-                <a:solidFill>
-                  <a:schemeClr val="tx2"/>
-                </a:solidFill>
-              </a:defRPr>
-            </a:lvl4pPr>
-            <a:lvl5pPr>
-              <a:defRPr baseline="0">
-                <a:solidFill>
-                  <a:schemeClr val="tx2"/>
-                </a:solidFill>
-              </a:defRPr>
-            </a:lvl5pPr>
-          </a:lstStyle>
+          <a:lstStyle/>
           <a:p>
             <a:pPr lvl="0"/>
             <a:r>
@@ -1519,13 +1329,19 @@
               <a:rPr lang="zh-TW" altLang="en-US"/>
               <a:t>第五層</a:t>
             </a:r>
-            <a:endParaRPr lang="en-US" dirty="0"/>
-          </a:p>
-        </p:txBody>
-      </p:sp>
-      <p:sp>
-        <p:nvSpPr>
-          <p:cNvPr id="4" name="Content Placeholder 3"/>
+            <a:endParaRPr lang="en-US"/>
+          </a:p>
+        </p:txBody>
+      </p:sp>
+      <p:sp>
+        <p:nvSpPr>
+          <p:cNvPr id="4" name="內容版面配置區 3">
+            <a:extLst>
+              <a:ext uri="{FF2B5EF4-FFF2-40B4-BE49-F238E27FC236}">
+                <a16:creationId xmlns:a16="http://schemas.microsoft.com/office/drawing/2014/main" id="{050FC4BE-BEB0-B609-E4B5-17F6D22C5804}"/>
+              </a:ext>
+            </a:extLst>
+          </p:cNvPr>
           <p:cNvSpPr>
             <a:spLocks noGrp="1"/>
           </p:cNvSpPr>
@@ -1535,49 +1351,13 @@
         </p:nvSpPr>
         <p:spPr>
           <a:xfrm>
-            <a:off x="6525403" y="2285999"/>
-            <a:ext cx="4447786" cy="3581401"/>
+            <a:off x="6172200" y="1825625"/>
+            <a:ext cx="5181600" cy="4351338"/>
           </a:xfrm>
         </p:spPr>
         <p:txBody>
           <a:bodyPr/>
-          <a:lstStyle>
-            <a:lvl1pPr>
-              <a:defRPr>
-                <a:solidFill>
-                  <a:schemeClr val="tx2"/>
-                </a:solidFill>
-              </a:defRPr>
-            </a:lvl1pPr>
-            <a:lvl2pPr>
-              <a:defRPr>
-                <a:solidFill>
-                  <a:schemeClr val="tx2"/>
-                </a:solidFill>
-              </a:defRPr>
-            </a:lvl2pPr>
-            <a:lvl3pPr>
-              <a:defRPr>
-                <a:solidFill>
-                  <a:schemeClr val="tx2"/>
-                </a:solidFill>
-              </a:defRPr>
-            </a:lvl3pPr>
-            <a:lvl4pPr>
-              <a:defRPr>
-                <a:solidFill>
-                  <a:schemeClr val="tx2"/>
-                </a:solidFill>
-              </a:defRPr>
-            </a:lvl4pPr>
-            <a:lvl5pPr>
-              <a:defRPr>
-                <a:solidFill>
-                  <a:schemeClr val="tx2"/>
-                </a:solidFill>
-              </a:defRPr>
-            </a:lvl5pPr>
-          </a:lstStyle>
+          <a:lstStyle/>
           <a:p>
             <a:pPr lvl="0"/>
             <a:r>
@@ -1612,13 +1392,19 @@
               <a:rPr lang="zh-TW" altLang="en-US"/>
               <a:t>第五層</a:t>
             </a:r>
-            <a:endParaRPr lang="en-US" dirty="0"/>
-          </a:p>
-        </p:txBody>
-      </p:sp>
-      <p:sp>
-        <p:nvSpPr>
-          <p:cNvPr id="5" name="Date Placeholder 4"/>
+            <a:endParaRPr lang="en-US"/>
+          </a:p>
+        </p:txBody>
+      </p:sp>
+      <p:sp>
+        <p:nvSpPr>
+          <p:cNvPr id="5" name="日期版面配置區 4">
+            <a:extLst>
+              <a:ext uri="{FF2B5EF4-FFF2-40B4-BE49-F238E27FC236}">
+                <a16:creationId xmlns:a16="http://schemas.microsoft.com/office/drawing/2014/main" id="{6FB4C5FA-2633-698D-F3F2-9C115C9EAEA6}"/>
+              </a:ext>
+            </a:extLst>
+          </p:cNvPr>
           <p:cNvSpPr>
             <a:spLocks noGrp="1"/>
           </p:cNvSpPr>
@@ -1633,7 +1419,7 @@
           <a:p>
             <a:fld id="{AE56CB72-CA00-42C8-B797-1F71B30B40C8}" type="datetimeFigureOut">
               <a:rPr lang="en-US" smtClean="0"/>
-              <a:t>6/18/2023</a:t>
+              <a:t>6/19/2023</a:t>
             </a:fld>
             <a:endParaRPr lang="en-US"/>
           </a:p>
@@ -1641,7 +1427,13 @@
       </p:sp>
       <p:sp>
         <p:nvSpPr>
-          <p:cNvPr id="6" name="Footer Placeholder 5"/>
+          <p:cNvPr id="6" name="頁尾版面配置區 5">
+            <a:extLst>
+              <a:ext uri="{FF2B5EF4-FFF2-40B4-BE49-F238E27FC236}">
+                <a16:creationId xmlns:a16="http://schemas.microsoft.com/office/drawing/2014/main" id="{A1D7338A-5480-4D37-554A-77611414B8FC}"/>
+              </a:ext>
+            </a:extLst>
+          </p:cNvPr>
           <p:cNvSpPr>
             <a:spLocks noGrp="1"/>
           </p:cNvSpPr>
@@ -1660,7 +1452,13 @@
       </p:sp>
       <p:sp>
         <p:nvSpPr>
-          <p:cNvPr id="7" name="Slide Number Placeholder 6"/>
+          <p:cNvPr id="7" name="投影片編號版面配置區 6">
+            <a:extLst>
+              <a:ext uri="{FF2B5EF4-FFF2-40B4-BE49-F238E27FC236}">
+                <a16:creationId xmlns:a16="http://schemas.microsoft.com/office/drawing/2014/main" id="{13E884BF-9A0F-AADA-8F43-F7B36E91A5A1}"/>
+              </a:ext>
+            </a:extLst>
+          </p:cNvPr>
           <p:cNvSpPr>
             <a:spLocks noGrp="1"/>
           </p:cNvSpPr>
@@ -1684,7 +1482,7 @@
     </p:spTree>
     <p:extLst>
       <p:ext uri="{BB962C8B-B14F-4D97-AF65-F5344CB8AC3E}">
-        <p14:creationId xmlns:p14="http://schemas.microsoft.com/office/powerpoint/2010/main" val="1313879979"/>
+        <p14:creationId xmlns:p14="http://schemas.microsoft.com/office/powerpoint/2010/main" val="2921294838"/>
       </p:ext>
     </p:extLst>
   </p:cSld>
@@ -1718,7 +1516,13 @@
       </p:grpSpPr>
       <p:sp>
         <p:nvSpPr>
-          <p:cNvPr id="2" name="Title 1"/>
+          <p:cNvPr id="2" name="標題 1">
+            <a:extLst>
+              <a:ext uri="{FF2B5EF4-FFF2-40B4-BE49-F238E27FC236}">
+                <a16:creationId xmlns:a16="http://schemas.microsoft.com/office/drawing/2014/main" id="{59324392-BB8D-751F-4B54-B38E6336E93B}"/>
+              </a:ext>
+            </a:extLst>
+          </p:cNvPr>
           <p:cNvSpPr>
             <a:spLocks noGrp="1"/>
           </p:cNvSpPr>
@@ -1728,33 +1532,31 @@
         </p:nvSpPr>
         <p:spPr>
           <a:xfrm>
-            <a:off x="1371600" y="685800"/>
-            <a:ext cx="9601200" cy="1485900"/>
+            <a:off x="839788" y="365125"/>
+            <a:ext cx="10515600" cy="1325563"/>
           </a:xfrm>
         </p:spPr>
         <p:txBody>
           <a:bodyPr/>
-          <a:lstStyle>
-            <a:lvl1pPr>
-              <a:defRPr>
-                <a:solidFill>
-                  <a:schemeClr val="tx2"/>
-                </a:solidFill>
-              </a:defRPr>
-            </a:lvl1pPr>
-          </a:lstStyle>
+          <a:lstStyle/>
           <a:p>
             <a:r>
               <a:rPr lang="zh-TW" altLang="en-US"/>
               <a:t>按一下以編輯母片標題樣式</a:t>
             </a:r>
-            <a:endParaRPr lang="en-US" dirty="0"/>
-          </a:p>
-        </p:txBody>
-      </p:sp>
-      <p:sp>
-        <p:nvSpPr>
-          <p:cNvPr id="3" name="Text Placeholder 2"/>
+            <a:endParaRPr lang="en-US"/>
+          </a:p>
+        </p:txBody>
+      </p:sp>
+      <p:sp>
+        <p:nvSpPr>
+          <p:cNvPr id="3" name="文字版面配置區 2">
+            <a:extLst>
+              <a:ext uri="{FF2B5EF4-FFF2-40B4-BE49-F238E27FC236}">
+                <a16:creationId xmlns:a16="http://schemas.microsoft.com/office/drawing/2014/main" id="{2DB01677-6F1C-B988-EBA5-E2FBD42D14BF}"/>
+              </a:ext>
+            </a:extLst>
+          </p:cNvPr>
           <p:cNvSpPr>
             <a:spLocks noGrp="1"/>
           </p:cNvSpPr>
@@ -1764,31 +1566,16 @@
         </p:nvSpPr>
         <p:spPr>
           <a:xfrm>
-            <a:off x="1371600" y="2340864"/>
-            <a:ext cx="4443984" cy="823912"/>
+            <a:off x="839788" y="1681163"/>
+            <a:ext cx="5157787" cy="823912"/>
           </a:xfrm>
         </p:spPr>
         <p:txBody>
-          <a:bodyPr anchor="b">
-            <a:noAutofit/>
-          </a:bodyPr>
+          <a:bodyPr anchor="b"/>
           <a:lstStyle>
             <a:lvl1pPr marL="0" indent="0">
-              <a:lnSpc>
-                <a:spcPct val="84000"/>
-              </a:lnSpc>
-              <a:spcBef>
-                <a:spcPts val="0"/>
-              </a:spcBef>
-              <a:spcAft>
-                <a:spcPts val="0"/>
-              </a:spcAft>
-              <a:buNone/>
-              <a:defRPr sz="3000" b="0" baseline="0">
-                <a:solidFill>
-                  <a:schemeClr val="tx2"/>
-                </a:solidFill>
-              </a:defRPr>
+              <a:buNone/>
+              <a:defRPr sz="2400" b="1"/>
             </a:lvl1pPr>
             <a:lvl2pPr marL="457200" indent="0">
               <a:buNone/>
@@ -1834,7 +1621,13 @@
       </p:sp>
       <p:sp>
         <p:nvSpPr>
-          <p:cNvPr id="4" name="Content Placeholder 3"/>
+          <p:cNvPr id="4" name="內容版面配置區 3">
+            <a:extLst>
+              <a:ext uri="{FF2B5EF4-FFF2-40B4-BE49-F238E27FC236}">
+                <a16:creationId xmlns:a16="http://schemas.microsoft.com/office/drawing/2014/main" id="{A1D413B6-D3FB-32AC-A141-FDD928791B5C}"/>
+              </a:ext>
+            </a:extLst>
+          </p:cNvPr>
           <p:cNvSpPr>
             <a:spLocks noGrp="1"/>
           </p:cNvSpPr>
@@ -1844,49 +1637,13 @@
         </p:nvSpPr>
         <p:spPr>
           <a:xfrm>
-            <a:off x="1371600" y="3305207"/>
-            <a:ext cx="4443984" cy="2562193"/>
+            <a:off x="839788" y="2505075"/>
+            <a:ext cx="5157787" cy="3684588"/>
           </a:xfrm>
         </p:spPr>
         <p:txBody>
           <a:bodyPr/>
-          <a:lstStyle>
-            <a:lvl1pPr>
-              <a:defRPr baseline="0">
-                <a:solidFill>
-                  <a:schemeClr val="tx2"/>
-                </a:solidFill>
-              </a:defRPr>
-            </a:lvl1pPr>
-            <a:lvl2pPr>
-              <a:defRPr baseline="0">
-                <a:solidFill>
-                  <a:schemeClr val="tx2"/>
-                </a:solidFill>
-              </a:defRPr>
-            </a:lvl2pPr>
-            <a:lvl3pPr>
-              <a:defRPr baseline="0">
-                <a:solidFill>
-                  <a:schemeClr val="tx2"/>
-                </a:solidFill>
-              </a:defRPr>
-            </a:lvl3pPr>
-            <a:lvl4pPr>
-              <a:defRPr baseline="0">
-                <a:solidFill>
-                  <a:schemeClr val="tx2"/>
-                </a:solidFill>
-              </a:defRPr>
-            </a:lvl4pPr>
-            <a:lvl5pPr>
-              <a:defRPr baseline="0">
-                <a:solidFill>
-                  <a:schemeClr val="tx2"/>
-                </a:solidFill>
-              </a:defRPr>
-            </a:lvl5pPr>
-          </a:lstStyle>
+          <a:lstStyle/>
           <a:p>
             <a:pPr lvl="0"/>
             <a:r>
@@ -1921,13 +1678,19 @@
               <a:rPr lang="zh-TW" altLang="en-US"/>
               <a:t>第五層</a:t>
             </a:r>
-            <a:endParaRPr lang="en-US" dirty="0"/>
-          </a:p>
-        </p:txBody>
-      </p:sp>
-      <p:sp>
-        <p:nvSpPr>
-          <p:cNvPr id="5" name="Text Placeholder 4"/>
+            <a:endParaRPr lang="en-US"/>
+          </a:p>
+        </p:txBody>
+      </p:sp>
+      <p:sp>
+        <p:nvSpPr>
+          <p:cNvPr id="5" name="文字版面配置區 4">
+            <a:extLst>
+              <a:ext uri="{FF2B5EF4-FFF2-40B4-BE49-F238E27FC236}">
+                <a16:creationId xmlns:a16="http://schemas.microsoft.com/office/drawing/2014/main" id="{CED46874-081D-F96C-B624-4C56D65D8BA5}"/>
+              </a:ext>
+            </a:extLst>
+          </p:cNvPr>
           <p:cNvSpPr>
             <a:spLocks noGrp="1"/>
           </p:cNvSpPr>
@@ -1937,31 +1700,16 @@
         </p:nvSpPr>
         <p:spPr>
           <a:xfrm>
-            <a:off x="6525014" y="2340864"/>
-            <a:ext cx="4443984" cy="823912"/>
+            <a:off x="6172200" y="1681163"/>
+            <a:ext cx="5183188" cy="823912"/>
           </a:xfrm>
         </p:spPr>
         <p:txBody>
-          <a:bodyPr anchor="b">
-            <a:noAutofit/>
-          </a:bodyPr>
+          <a:bodyPr anchor="b"/>
           <a:lstStyle>
             <a:lvl1pPr marL="0" indent="0">
-              <a:lnSpc>
-                <a:spcPct val="84000"/>
-              </a:lnSpc>
-              <a:spcBef>
-                <a:spcPts val="0"/>
-              </a:spcBef>
-              <a:spcAft>
-                <a:spcPts val="0"/>
-              </a:spcAft>
-              <a:buNone/>
-              <a:defRPr sz="3000" b="0" baseline="0">
-                <a:solidFill>
-                  <a:schemeClr val="tx2"/>
-                </a:solidFill>
-              </a:defRPr>
+              <a:buNone/>
+              <a:defRPr sz="2400" b="1"/>
             </a:lvl1pPr>
             <a:lvl2pPr marL="457200" indent="0">
               <a:buNone/>
@@ -2007,7 +1755,13 @@
       </p:sp>
       <p:sp>
         <p:nvSpPr>
-          <p:cNvPr id="6" name="Content Placeholder 5"/>
+          <p:cNvPr id="6" name="內容版面配置區 5">
+            <a:extLst>
+              <a:ext uri="{FF2B5EF4-FFF2-40B4-BE49-F238E27FC236}">
+                <a16:creationId xmlns:a16="http://schemas.microsoft.com/office/drawing/2014/main" id="{59D0CAD7-0A63-CE7B-D58B-1BDEAEC667C2}"/>
+              </a:ext>
+            </a:extLst>
+          </p:cNvPr>
           <p:cNvSpPr>
             <a:spLocks noGrp="1"/>
           </p:cNvSpPr>
@@ -2017,49 +1771,13 @@
         </p:nvSpPr>
         <p:spPr>
           <a:xfrm>
-            <a:off x="6525014" y="3305207"/>
-            <a:ext cx="4443984" cy="2562193"/>
+            <a:off x="6172200" y="2505075"/>
+            <a:ext cx="5183188" cy="3684588"/>
           </a:xfrm>
         </p:spPr>
         <p:txBody>
           <a:bodyPr/>
-          <a:lstStyle>
-            <a:lvl1pPr>
-              <a:defRPr baseline="0">
-                <a:solidFill>
-                  <a:schemeClr val="tx2"/>
-                </a:solidFill>
-              </a:defRPr>
-            </a:lvl1pPr>
-            <a:lvl2pPr>
-              <a:defRPr baseline="0">
-                <a:solidFill>
-                  <a:schemeClr val="tx2"/>
-                </a:solidFill>
-              </a:defRPr>
-            </a:lvl2pPr>
-            <a:lvl3pPr>
-              <a:defRPr baseline="0">
-                <a:solidFill>
-                  <a:schemeClr val="tx2"/>
-                </a:solidFill>
-              </a:defRPr>
-            </a:lvl3pPr>
-            <a:lvl4pPr>
-              <a:defRPr baseline="0">
-                <a:solidFill>
-                  <a:schemeClr val="tx2"/>
-                </a:solidFill>
-              </a:defRPr>
-            </a:lvl4pPr>
-            <a:lvl5pPr>
-              <a:defRPr baseline="0">
-                <a:solidFill>
-                  <a:schemeClr val="tx2"/>
-                </a:solidFill>
-              </a:defRPr>
-            </a:lvl5pPr>
-          </a:lstStyle>
+          <a:lstStyle/>
           <a:p>
             <a:pPr lvl="0"/>
             <a:r>
@@ -2094,13 +1812,19 @@
               <a:rPr lang="zh-TW" altLang="en-US"/>
               <a:t>第五層</a:t>
             </a:r>
-            <a:endParaRPr lang="en-US" dirty="0"/>
-          </a:p>
-        </p:txBody>
-      </p:sp>
-      <p:sp>
-        <p:nvSpPr>
-          <p:cNvPr id="7" name="Date Placeholder 6"/>
+            <a:endParaRPr lang="en-US"/>
+          </a:p>
+        </p:txBody>
+      </p:sp>
+      <p:sp>
+        <p:nvSpPr>
+          <p:cNvPr id="7" name="日期版面配置區 6">
+            <a:extLst>
+              <a:ext uri="{FF2B5EF4-FFF2-40B4-BE49-F238E27FC236}">
+                <a16:creationId xmlns:a16="http://schemas.microsoft.com/office/drawing/2014/main" id="{D4719DDF-5DF0-27BB-FF53-4EE5ACFEBE6C}"/>
+              </a:ext>
+            </a:extLst>
+          </p:cNvPr>
           <p:cNvSpPr>
             <a:spLocks noGrp="1"/>
           </p:cNvSpPr>
@@ -2115,7 +1839,7 @@
           <a:p>
             <a:fld id="{AE56CB72-CA00-42C8-B797-1F71B30B40C8}" type="datetimeFigureOut">
               <a:rPr lang="en-US" smtClean="0"/>
-              <a:t>6/18/2023</a:t>
+              <a:t>6/19/2023</a:t>
             </a:fld>
             <a:endParaRPr lang="en-US"/>
           </a:p>
@@ -2123,7 +1847,13 @@
       </p:sp>
       <p:sp>
         <p:nvSpPr>
-          <p:cNvPr id="8" name="Footer Placeholder 7"/>
+          <p:cNvPr id="8" name="頁尾版面配置區 7">
+            <a:extLst>
+              <a:ext uri="{FF2B5EF4-FFF2-40B4-BE49-F238E27FC236}">
+                <a16:creationId xmlns:a16="http://schemas.microsoft.com/office/drawing/2014/main" id="{02A3D7E8-58B7-82C4-5CA4-12223808A4D5}"/>
+              </a:ext>
+            </a:extLst>
+          </p:cNvPr>
           <p:cNvSpPr>
             <a:spLocks noGrp="1"/>
           </p:cNvSpPr>
@@ -2142,7 +1872,13 @@
       </p:sp>
       <p:sp>
         <p:nvSpPr>
-          <p:cNvPr id="9" name="Slide Number Placeholder 8"/>
+          <p:cNvPr id="9" name="投影片編號版面配置區 8">
+            <a:extLst>
+              <a:ext uri="{FF2B5EF4-FFF2-40B4-BE49-F238E27FC236}">
+                <a16:creationId xmlns:a16="http://schemas.microsoft.com/office/drawing/2014/main" id="{F0C9472E-BA4C-2C4A-00CE-B71F801B14C4}"/>
+              </a:ext>
+            </a:extLst>
+          </p:cNvPr>
           <p:cNvSpPr>
             <a:spLocks noGrp="1"/>
           </p:cNvSpPr>
@@ -2166,7 +1902,7 @@
     </p:spTree>
     <p:extLst>
       <p:ext uri="{BB962C8B-B14F-4D97-AF65-F5344CB8AC3E}">
-        <p14:creationId xmlns:p14="http://schemas.microsoft.com/office/powerpoint/2010/main" val="2070596480"/>
+        <p14:creationId xmlns:p14="http://schemas.microsoft.com/office/powerpoint/2010/main" val="3304445326"/>
       </p:ext>
     </p:extLst>
   </p:cSld>
@@ -2200,7 +1936,13 @@
       </p:grpSpPr>
       <p:sp>
         <p:nvSpPr>
-          <p:cNvPr id="2" name="Title 1"/>
+          <p:cNvPr id="2" name="標題 1">
+            <a:extLst>
+              <a:ext uri="{FF2B5EF4-FFF2-40B4-BE49-F238E27FC236}">
+                <a16:creationId xmlns:a16="http://schemas.microsoft.com/office/drawing/2014/main" id="{1D393B77-320D-94A1-E61D-B910B1570FD4}"/>
+              </a:ext>
+            </a:extLst>
+          </p:cNvPr>
           <p:cNvSpPr>
             <a:spLocks noGrp="1"/>
           </p:cNvSpPr>
@@ -2217,13 +1959,19 @@
               <a:rPr lang="zh-TW" altLang="en-US"/>
               <a:t>按一下以編輯母片標題樣式</a:t>
             </a:r>
-            <a:endParaRPr lang="en-US" dirty="0"/>
-          </a:p>
-        </p:txBody>
-      </p:sp>
-      <p:sp>
-        <p:nvSpPr>
-          <p:cNvPr id="3" name="Date Placeholder 2"/>
+            <a:endParaRPr lang="en-US"/>
+          </a:p>
+        </p:txBody>
+      </p:sp>
+      <p:sp>
+        <p:nvSpPr>
+          <p:cNvPr id="3" name="日期版面配置區 2">
+            <a:extLst>
+              <a:ext uri="{FF2B5EF4-FFF2-40B4-BE49-F238E27FC236}">
+                <a16:creationId xmlns:a16="http://schemas.microsoft.com/office/drawing/2014/main" id="{48AD381F-CDE7-18E6-8163-2C35707713DC}"/>
+              </a:ext>
+            </a:extLst>
+          </p:cNvPr>
           <p:cNvSpPr>
             <a:spLocks noGrp="1"/>
           </p:cNvSpPr>
@@ -2238,7 +1986,7 @@
           <a:p>
             <a:fld id="{AE56CB72-CA00-42C8-B797-1F71B30B40C8}" type="datetimeFigureOut">
               <a:rPr lang="en-US" smtClean="0"/>
-              <a:t>6/18/2023</a:t>
+              <a:t>6/19/2023</a:t>
             </a:fld>
             <a:endParaRPr lang="en-US"/>
           </a:p>
@@ -2246,7 +1994,13 @@
       </p:sp>
       <p:sp>
         <p:nvSpPr>
-          <p:cNvPr id="4" name="Footer Placeholder 3"/>
+          <p:cNvPr id="4" name="頁尾版面配置區 3">
+            <a:extLst>
+              <a:ext uri="{FF2B5EF4-FFF2-40B4-BE49-F238E27FC236}">
+                <a16:creationId xmlns:a16="http://schemas.microsoft.com/office/drawing/2014/main" id="{4535247C-CF3E-DA07-DFE8-D8FD62C62D3C}"/>
+              </a:ext>
+            </a:extLst>
+          </p:cNvPr>
           <p:cNvSpPr>
             <a:spLocks noGrp="1"/>
           </p:cNvSpPr>
@@ -2265,7 +2019,13 @@
       </p:sp>
       <p:sp>
         <p:nvSpPr>
-          <p:cNvPr id="5" name="Slide Number Placeholder 4"/>
+          <p:cNvPr id="5" name="投影片編號版面配置區 4">
+            <a:extLst>
+              <a:ext uri="{FF2B5EF4-FFF2-40B4-BE49-F238E27FC236}">
+                <a16:creationId xmlns:a16="http://schemas.microsoft.com/office/drawing/2014/main" id="{7B0B545B-9DCD-BC48-86DF-1688438A377E}"/>
+              </a:ext>
+            </a:extLst>
+          </p:cNvPr>
           <p:cNvSpPr>
             <a:spLocks noGrp="1"/>
           </p:cNvSpPr>
@@ -2289,7 +2049,7 @@
     </p:spTree>
     <p:extLst>
       <p:ext uri="{BB962C8B-B14F-4D97-AF65-F5344CB8AC3E}">
-        <p14:creationId xmlns:p14="http://schemas.microsoft.com/office/powerpoint/2010/main" val="2430062061"/>
+        <p14:creationId xmlns:p14="http://schemas.microsoft.com/office/powerpoint/2010/main" val="4062390331"/>
       </p:ext>
     </p:extLst>
   </p:cSld>
@@ -2318,7 +2078,13 @@
       </p:grpSpPr>
       <p:sp>
         <p:nvSpPr>
-          <p:cNvPr id="2" name="Date Placeholder 1"/>
+          <p:cNvPr id="2" name="日期版面配置區 1">
+            <a:extLst>
+              <a:ext uri="{FF2B5EF4-FFF2-40B4-BE49-F238E27FC236}">
+                <a16:creationId xmlns:a16="http://schemas.microsoft.com/office/drawing/2014/main" id="{5D062E2A-CFEC-964B-88C1-F7454EABA7E7}"/>
+              </a:ext>
+            </a:extLst>
+          </p:cNvPr>
           <p:cNvSpPr>
             <a:spLocks noGrp="1"/>
           </p:cNvSpPr>
@@ -2333,7 +2099,7 @@
           <a:p>
             <a:fld id="{AE56CB72-CA00-42C8-B797-1F71B30B40C8}" type="datetimeFigureOut">
               <a:rPr lang="en-US" smtClean="0"/>
-              <a:t>6/18/2023</a:t>
+              <a:t>6/19/2023</a:t>
             </a:fld>
             <a:endParaRPr lang="en-US"/>
           </a:p>
@@ -2341,7 +2107,13 @@
       </p:sp>
       <p:sp>
         <p:nvSpPr>
-          <p:cNvPr id="3" name="Footer Placeholder 2"/>
+          <p:cNvPr id="3" name="頁尾版面配置區 2">
+            <a:extLst>
+              <a:ext uri="{FF2B5EF4-FFF2-40B4-BE49-F238E27FC236}">
+                <a16:creationId xmlns:a16="http://schemas.microsoft.com/office/drawing/2014/main" id="{947E7244-BE7A-CF5E-F25C-C0A62A531D9D}"/>
+              </a:ext>
+            </a:extLst>
+          </p:cNvPr>
           <p:cNvSpPr>
             <a:spLocks noGrp="1"/>
           </p:cNvSpPr>
@@ -2360,7 +2132,13 @@
       </p:sp>
       <p:sp>
         <p:nvSpPr>
-          <p:cNvPr id="4" name="Slide Number Placeholder 3"/>
+          <p:cNvPr id="4" name="投影片編號版面配置區 3">
+            <a:extLst>
+              <a:ext uri="{FF2B5EF4-FFF2-40B4-BE49-F238E27FC236}">
+                <a16:creationId xmlns:a16="http://schemas.microsoft.com/office/drawing/2014/main" id="{66CF3529-F7DE-BB05-A1A3-4D92E2AE2BBA}"/>
+              </a:ext>
+            </a:extLst>
+          </p:cNvPr>
           <p:cNvSpPr>
             <a:spLocks noGrp="1"/>
           </p:cNvSpPr>
@@ -2384,7 +2162,7 @@
     </p:spTree>
     <p:extLst>
       <p:ext uri="{BB962C8B-B14F-4D97-AF65-F5344CB8AC3E}">
-        <p14:creationId xmlns:p14="http://schemas.microsoft.com/office/powerpoint/2010/main" val="967611611"/>
+        <p14:creationId xmlns:p14="http://schemas.microsoft.com/office/powerpoint/2010/main" val="72455015"/>
       </p:ext>
     </p:extLst>
   </p:cSld>
@@ -2395,7 +2173,7 @@
 </file>
 
 <file path=ppt/slideLayouts/slideLayout8.xml><?xml version="1.0" encoding="utf-8"?>
-<p:sldLayout xmlns:a="http://schemas.openxmlformats.org/drawingml/2006/main" xmlns:r="http://schemas.openxmlformats.org/officeDocument/2006/relationships" xmlns:p="http://schemas.openxmlformats.org/presentationml/2006/main" showMasterSp="0" type="objTx" preserve="1">
+<p:sldLayout xmlns:a="http://schemas.openxmlformats.org/drawingml/2006/main" xmlns:r="http://schemas.openxmlformats.org/officeDocument/2006/relationships" xmlns:p="http://schemas.openxmlformats.org/presentationml/2006/main" type="objTx" preserve="1">
   <p:cSld name="含輔助字幕的內容">
     <p:spTree>
       <p:nvGrpSpPr>
@@ -2413,197 +2191,159 @@
       </p:grpSpPr>
       <p:sp>
         <p:nvSpPr>
-          <p:cNvPr id="8" name="Rectangle 7" title="Background Shape"/>
-          <p:cNvSpPr/>
-          <p:nvPr/>
+          <p:cNvPr id="2" name="標題 1">
+            <a:extLst>
+              <a:ext uri="{FF2B5EF4-FFF2-40B4-BE49-F238E27FC236}">
+                <a16:creationId xmlns:a16="http://schemas.microsoft.com/office/drawing/2014/main" id="{C79B62BE-F72F-1717-3101-7E19842AA43C}"/>
+              </a:ext>
+            </a:extLst>
+          </p:cNvPr>
+          <p:cNvSpPr>
+            <a:spLocks noGrp="1"/>
+          </p:cNvSpPr>
+          <p:nvPr>
+            <p:ph type="title"/>
+          </p:nvPr>
         </p:nvSpPr>
         <p:spPr>
           <a:xfrm>
-            <a:off x="0" y="376"/>
-            <a:ext cx="5303520" cy="6857624"/>
+            <a:off x="839788" y="457200"/>
+            <a:ext cx="3932237" cy="1600200"/>
           </a:xfrm>
-          <a:prstGeom prst="rect">
-            <a:avLst/>
-          </a:prstGeom>
-          <a:solidFill>
-            <a:schemeClr val="accent1"/>
-          </a:solidFill>
-          <a:ln>
-            <a:noFill/>
-          </a:ln>
         </p:spPr>
-        <p:style>
-          <a:lnRef idx="2">
-            <a:schemeClr val="accent1">
-              <a:shade val="50000"/>
-            </a:schemeClr>
-          </a:lnRef>
-          <a:fillRef idx="1">
-            <a:schemeClr val="accent1"/>
-          </a:fillRef>
-          <a:effectRef idx="0">
-            <a:schemeClr val="accent1"/>
-          </a:effectRef>
-          <a:fontRef idx="minor">
-            <a:schemeClr val="lt1"/>
-          </a:fontRef>
-        </p:style>
-      </p:sp>
-      <p:sp>
-        <p:nvSpPr>
-          <p:cNvPr id="2" name="Title 1"/>
-          <p:cNvSpPr>
-            <a:spLocks noGrp="1"/>
-          </p:cNvSpPr>
-          <p:nvPr>
-            <p:ph type="title"/>
+        <p:txBody>
+          <a:bodyPr anchor="b"/>
+          <a:lstStyle>
+            <a:lvl1pPr>
+              <a:defRPr sz="3200"/>
+            </a:lvl1pPr>
+          </a:lstStyle>
+          <a:p>
+            <a:r>
+              <a:rPr lang="zh-TW" altLang="en-US"/>
+              <a:t>按一下以編輯母片標題樣式</a:t>
+            </a:r>
+            <a:endParaRPr lang="en-US"/>
+          </a:p>
+        </p:txBody>
+      </p:sp>
+      <p:sp>
+        <p:nvSpPr>
+          <p:cNvPr id="3" name="內容版面配置區 2">
+            <a:extLst>
+              <a:ext uri="{FF2B5EF4-FFF2-40B4-BE49-F238E27FC236}">
+                <a16:creationId xmlns:a16="http://schemas.microsoft.com/office/drawing/2014/main" id="{3CB08171-A73A-7A36-00C1-2802F78A016C}"/>
+              </a:ext>
+            </a:extLst>
+          </p:cNvPr>
+          <p:cNvSpPr>
+            <a:spLocks noGrp="1"/>
+          </p:cNvSpPr>
+          <p:nvPr>
+            <p:ph idx="1"/>
           </p:nvPr>
         </p:nvSpPr>
         <p:spPr>
           <a:xfrm>
-            <a:off x="723900" y="685800"/>
-            <a:ext cx="3855720" cy="2157884"/>
+            <a:off x="5183188" y="987425"/>
+            <a:ext cx="6172200" cy="4873625"/>
           </a:xfrm>
         </p:spPr>
         <p:txBody>
-          <a:bodyPr anchor="t">
-            <a:noAutofit/>
-          </a:bodyPr>
+          <a:bodyPr/>
           <a:lstStyle>
             <a:lvl1pPr>
-              <a:lnSpc>
-                <a:spcPct val="84000"/>
-              </a:lnSpc>
-              <a:defRPr sz="4800" baseline="0">
-                <a:solidFill>
-                  <a:schemeClr val="tx2"/>
-                </a:solidFill>
-              </a:defRPr>
+              <a:defRPr sz="3200"/>
             </a:lvl1pPr>
+            <a:lvl2pPr>
+              <a:defRPr sz="2800"/>
+            </a:lvl2pPr>
+            <a:lvl3pPr>
+              <a:defRPr sz="2400"/>
+            </a:lvl3pPr>
+            <a:lvl4pPr>
+              <a:defRPr sz="2000"/>
+            </a:lvl4pPr>
+            <a:lvl5pPr>
+              <a:defRPr sz="2000"/>
+            </a:lvl5pPr>
+            <a:lvl6pPr>
+              <a:defRPr sz="2000"/>
+            </a:lvl6pPr>
+            <a:lvl7pPr>
+              <a:defRPr sz="2000"/>
+            </a:lvl7pPr>
+            <a:lvl8pPr>
+              <a:defRPr sz="2000"/>
+            </a:lvl8pPr>
+            <a:lvl9pPr>
+              <a:defRPr sz="2000"/>
+            </a:lvl9pPr>
           </a:lstStyle>
           <a:p>
-            <a:r>
-              <a:rPr lang="zh-TW" altLang="en-US"/>
-              <a:t>按一下以編輯母片標題樣式</a:t>
-            </a:r>
-            <a:endParaRPr lang="en-US" dirty="0"/>
-          </a:p>
-        </p:txBody>
-      </p:sp>
-      <p:sp>
-        <p:nvSpPr>
-          <p:cNvPr id="3" name="Content Placeholder 2"/>
-          <p:cNvSpPr>
-            <a:spLocks noGrp="1"/>
-          </p:cNvSpPr>
-          <p:nvPr>
-            <p:ph idx="1"/>
+            <a:pPr lvl="0"/>
+            <a:r>
+              <a:rPr lang="zh-TW" altLang="en-US"/>
+              <a:t>按一下以編輯母片文字樣式</a:t>
+            </a:r>
+          </a:p>
+          <a:p>
+            <a:pPr lvl="1"/>
+            <a:r>
+              <a:rPr lang="zh-TW" altLang="en-US"/>
+              <a:t>第二層</a:t>
+            </a:r>
+          </a:p>
+          <a:p>
+            <a:pPr lvl="2"/>
+            <a:r>
+              <a:rPr lang="zh-TW" altLang="en-US"/>
+              <a:t>第三層</a:t>
+            </a:r>
+          </a:p>
+          <a:p>
+            <a:pPr lvl="3"/>
+            <a:r>
+              <a:rPr lang="zh-TW" altLang="en-US"/>
+              <a:t>第四層</a:t>
+            </a:r>
+          </a:p>
+          <a:p>
+            <a:pPr lvl="4"/>
+            <a:r>
+              <a:rPr lang="zh-TW" altLang="en-US"/>
+              <a:t>第五層</a:t>
+            </a:r>
+            <a:endParaRPr lang="en-US"/>
+          </a:p>
+        </p:txBody>
+      </p:sp>
+      <p:sp>
+        <p:nvSpPr>
+          <p:cNvPr id="4" name="文字版面配置區 3">
+            <a:extLst>
+              <a:ext uri="{FF2B5EF4-FFF2-40B4-BE49-F238E27FC236}">
+                <a16:creationId xmlns:a16="http://schemas.microsoft.com/office/drawing/2014/main" id="{001869E4-D1DB-E942-6CBA-4C205F7EA4A5}"/>
+              </a:ext>
+            </a:extLst>
+          </p:cNvPr>
+          <p:cNvSpPr>
+            <a:spLocks noGrp="1"/>
+          </p:cNvSpPr>
+          <p:nvPr>
+            <p:ph type="body" sz="half" idx="2"/>
           </p:nvPr>
         </p:nvSpPr>
         <p:spPr>
           <a:xfrm>
-            <a:off x="6256020" y="685801"/>
-            <a:ext cx="5212080" cy="5175250"/>
+            <a:off x="839788" y="2057400"/>
+            <a:ext cx="3932237" cy="3811588"/>
           </a:xfrm>
         </p:spPr>
         <p:txBody>
           <a:bodyPr/>
           <a:lstStyle>
-            <a:lvl1pPr>
-              <a:defRPr sz="2000"/>
-            </a:lvl1pPr>
-            <a:lvl2pPr>
-              <a:defRPr sz="2000"/>
-            </a:lvl2pPr>
-            <a:lvl3pPr>
-              <a:defRPr sz="1800"/>
-            </a:lvl3pPr>
-            <a:lvl4pPr>
-              <a:defRPr sz="1800"/>
-            </a:lvl4pPr>
-            <a:lvl5pPr>
-              <a:defRPr sz="1600"/>
-            </a:lvl5pPr>
-            <a:lvl6pPr>
-              <a:defRPr sz="1600"/>
-            </a:lvl6pPr>
-            <a:lvl7pPr>
-              <a:defRPr sz="1600"/>
-            </a:lvl7pPr>
-            <a:lvl8pPr>
-              <a:defRPr sz="1600"/>
-            </a:lvl8pPr>
-            <a:lvl9pPr>
-              <a:defRPr sz="1600"/>
-            </a:lvl9pPr>
-          </a:lstStyle>
-          <a:p>
-            <a:pPr lvl="0"/>
-            <a:r>
-              <a:rPr lang="zh-TW" altLang="en-US"/>
-              <a:t>按一下以編輯母片文字樣式</a:t>
-            </a:r>
-          </a:p>
-          <a:p>
-            <a:pPr lvl="1"/>
-            <a:r>
-              <a:rPr lang="zh-TW" altLang="en-US"/>
-              <a:t>第二層</a:t>
-            </a:r>
-          </a:p>
-          <a:p>
-            <a:pPr lvl="2"/>
-            <a:r>
-              <a:rPr lang="zh-TW" altLang="en-US"/>
-              <a:t>第三層</a:t>
-            </a:r>
-          </a:p>
-          <a:p>
-            <a:pPr lvl="3"/>
-            <a:r>
-              <a:rPr lang="zh-TW" altLang="en-US"/>
-              <a:t>第四層</a:t>
-            </a:r>
-          </a:p>
-          <a:p>
-            <a:pPr lvl="4"/>
-            <a:r>
-              <a:rPr lang="zh-TW" altLang="en-US"/>
-              <a:t>第五層</a:t>
-            </a:r>
-            <a:endParaRPr lang="en-US" dirty="0"/>
-          </a:p>
-        </p:txBody>
-      </p:sp>
-      <p:sp>
-        <p:nvSpPr>
-          <p:cNvPr id="4" name="Text Placeholder 3"/>
-          <p:cNvSpPr>
-            <a:spLocks noGrp="1"/>
-          </p:cNvSpPr>
-          <p:nvPr>
-            <p:ph type="body" sz="half" idx="2"/>
-          </p:nvPr>
-        </p:nvSpPr>
-        <p:spPr>
-          <a:xfrm>
-            <a:off x="723900" y="2856344"/>
-            <a:ext cx="3855720" cy="3011056"/>
-          </a:xfrm>
-        </p:spPr>
-        <p:txBody>
-          <a:bodyPr/>
-          <a:lstStyle>
             <a:lvl1pPr marL="0" indent="0">
-              <a:lnSpc>
-                <a:spcPct val="113000"/>
-              </a:lnSpc>
-              <a:spcBef>
-                <a:spcPts val="0"/>
-              </a:spcBef>
-              <a:spcAft>
-                <a:spcPts val="1500"/>
-              </a:spcAft>
               <a:buNone/>
               <a:defRPr sz="1600"/>
             </a:lvl1pPr>
@@ -2651,7 +2391,13 @@
       </p:sp>
       <p:sp>
         <p:nvSpPr>
-          <p:cNvPr id="5" name="Date Placeholder 4"/>
+          <p:cNvPr id="5" name="日期版面配置區 4">
+            <a:extLst>
+              <a:ext uri="{FF2B5EF4-FFF2-40B4-BE49-F238E27FC236}">
+                <a16:creationId xmlns:a16="http://schemas.microsoft.com/office/drawing/2014/main" id="{9F941FC9-DC8C-5741-76ED-CE6370F2A251}"/>
+              </a:ext>
+            </a:extLst>
+          </p:cNvPr>
           <p:cNvSpPr>
             <a:spLocks noGrp="1"/>
           </p:cNvSpPr>
@@ -2659,27 +2405,14 @@
             <p:ph type="dt" sz="half" idx="10"/>
           </p:nvPr>
         </p:nvSpPr>
-        <p:spPr>
-          <a:xfrm>
-            <a:off x="723900" y="6453386"/>
-            <a:ext cx="1204572" cy="404614"/>
-          </a:xfrm>
-        </p:spPr>
-        <p:txBody>
-          <a:bodyPr/>
-          <a:lstStyle>
-            <a:lvl1pPr>
-              <a:defRPr>
-                <a:solidFill>
-                  <a:schemeClr val="tx2"/>
-                </a:solidFill>
-              </a:defRPr>
-            </a:lvl1pPr>
-          </a:lstStyle>
+        <p:spPr/>
+        <p:txBody>
+          <a:bodyPr/>
+          <a:lstStyle/>
           <a:p>
             <a:fld id="{AE56CB72-CA00-42C8-B797-1F71B30B40C8}" type="datetimeFigureOut">
               <a:rPr lang="en-US" smtClean="0"/>
-              <a:t>6/18/2023</a:t>
+              <a:t>6/19/2023</a:t>
             </a:fld>
             <a:endParaRPr lang="en-US"/>
           </a:p>
@@ -2687,7 +2420,13 @@
       </p:sp>
       <p:sp>
         <p:nvSpPr>
-          <p:cNvPr id="6" name="Footer Placeholder 5"/>
+          <p:cNvPr id="6" name="頁尾版面配置區 5">
+            <a:extLst>
+              <a:ext uri="{FF2B5EF4-FFF2-40B4-BE49-F238E27FC236}">
+                <a16:creationId xmlns:a16="http://schemas.microsoft.com/office/drawing/2014/main" id="{D58ED65A-73C4-B62B-B8B3-9B6D8D0D6125}"/>
+              </a:ext>
+            </a:extLst>
+          </p:cNvPr>
           <p:cNvSpPr>
             <a:spLocks noGrp="1"/>
           </p:cNvSpPr>
@@ -2695,31 +2434,24 @@
             <p:ph type="ftr" sz="quarter" idx="11"/>
           </p:nvPr>
         </p:nvSpPr>
-        <p:spPr>
-          <a:xfrm>
-            <a:off x="2205945" y="6453386"/>
-            <a:ext cx="2373675" cy="404614"/>
-          </a:xfrm>
-        </p:spPr>
-        <p:txBody>
-          <a:bodyPr/>
-          <a:lstStyle>
-            <a:lvl1pPr>
-              <a:defRPr>
-                <a:solidFill>
-                  <a:schemeClr val="tx2"/>
-                </a:solidFill>
-              </a:defRPr>
-            </a:lvl1pPr>
-          </a:lstStyle>
-          <a:p>
-            <a:endParaRPr lang="en-US"/>
-          </a:p>
-        </p:txBody>
-      </p:sp>
-      <p:sp>
-        <p:nvSpPr>
-          <p:cNvPr id="7" name="Slide Number Placeholder 6"/>
+        <p:spPr/>
+        <p:txBody>
+          <a:bodyPr/>
+          <a:lstStyle/>
+          <a:p>
+            <a:endParaRPr lang="en-US"/>
+          </a:p>
+        </p:txBody>
+      </p:sp>
+      <p:sp>
+        <p:nvSpPr>
+          <p:cNvPr id="7" name="投影片編號版面配置區 6">
+            <a:extLst>
+              <a:ext uri="{FF2B5EF4-FFF2-40B4-BE49-F238E27FC236}">
+                <a16:creationId xmlns:a16="http://schemas.microsoft.com/office/drawing/2014/main" id="{33683995-C5D4-616B-69B9-C1521E337B70}"/>
+              </a:ext>
+            </a:extLst>
+          </p:cNvPr>
           <p:cNvSpPr>
             <a:spLocks noGrp="1"/>
           </p:cNvSpPr>
@@ -2727,23 +2459,10 @@
             <p:ph type="sldNum" sz="quarter" idx="12"/>
           </p:nvPr>
         </p:nvSpPr>
-        <p:spPr>
-          <a:xfrm>
-            <a:off x="9883140" y="6453386"/>
-            <a:ext cx="1596292" cy="404614"/>
-          </a:xfrm>
-        </p:spPr>
-        <p:txBody>
-          <a:bodyPr/>
-          <a:lstStyle>
-            <a:lvl1pPr>
-              <a:defRPr>
-                <a:solidFill>
-                  <a:schemeClr val="tx2"/>
-                </a:solidFill>
-              </a:defRPr>
-            </a:lvl1pPr>
-          </a:lstStyle>
+        <p:spPr/>
+        <p:txBody>
+          <a:bodyPr/>
+          <a:lstStyle/>
           <a:p>
             <a:fld id="{8F3D733B-2F1E-4CDE-9271-9DDBC48C7550}" type="slidenum">
               <a:rPr lang="en-US" smtClean="0"/>
@@ -2753,48 +2472,10 @@
           </a:p>
         </p:txBody>
       </p:sp>
-      <p:sp>
-        <p:nvSpPr>
-          <p:cNvPr id="9" name="Rectangle 8" title="Divider Bar"/>
-          <p:cNvSpPr/>
-          <p:nvPr/>
-        </p:nvSpPr>
-        <p:spPr>
-          <a:xfrm>
-            <a:off x="5303520" y="376"/>
-            <a:ext cx="228600" cy="6858000"/>
-          </a:xfrm>
-          <a:prstGeom prst="rect">
-            <a:avLst/>
-          </a:prstGeom>
-          <a:solidFill>
-            <a:schemeClr val="tx2"/>
-          </a:solidFill>
-          <a:ln>
-            <a:noFill/>
-          </a:ln>
-        </p:spPr>
-        <p:style>
-          <a:lnRef idx="2">
-            <a:schemeClr val="accent1">
-              <a:shade val="50000"/>
-            </a:schemeClr>
-          </a:lnRef>
-          <a:fillRef idx="1">
-            <a:schemeClr val="accent1"/>
-          </a:fillRef>
-          <a:effectRef idx="0">
-            <a:schemeClr val="accent1"/>
-          </a:effectRef>
-          <a:fontRef idx="minor">
-            <a:schemeClr val="lt1"/>
-          </a:fontRef>
-        </p:style>
-      </p:sp>
     </p:spTree>
     <p:extLst>
       <p:ext uri="{BB962C8B-B14F-4D97-AF65-F5344CB8AC3E}">
-        <p14:creationId xmlns:p14="http://schemas.microsoft.com/office/powerpoint/2010/main" val="3262413942"/>
+        <p14:creationId xmlns:p14="http://schemas.microsoft.com/office/powerpoint/2010/main" val="2998606849"/>
       </p:ext>
     </p:extLst>
   </p:cSld>
@@ -2810,7 +2491,7 @@
 </file>
 
 <file path=ppt/slideLayouts/slideLayout9.xml><?xml version="1.0" encoding="utf-8"?>
-<p:sldLayout xmlns:a="http://schemas.openxmlformats.org/drawingml/2006/main" xmlns:r="http://schemas.openxmlformats.org/officeDocument/2006/relationships" xmlns:p="http://schemas.openxmlformats.org/presentationml/2006/main" showMasterSp="0" type="picTx" preserve="1">
+<p:sldLayout xmlns:a="http://schemas.openxmlformats.org/drawingml/2006/main" xmlns:r="http://schemas.openxmlformats.org/officeDocument/2006/relationships" xmlns:p="http://schemas.openxmlformats.org/presentationml/2006/main" type="picTx" preserve="1">
   <p:cSld name="含輔助字幕的圖片">
     <p:spTree>
       <p:nvGrpSpPr>
@@ -2828,111 +2509,78 @@
       </p:grpSpPr>
       <p:sp>
         <p:nvSpPr>
-          <p:cNvPr id="8" name="Rectangle 7" title="Background Shape"/>
-          <p:cNvSpPr/>
-          <p:nvPr/>
+          <p:cNvPr id="2" name="標題 1">
+            <a:extLst>
+              <a:ext uri="{FF2B5EF4-FFF2-40B4-BE49-F238E27FC236}">
+                <a16:creationId xmlns:a16="http://schemas.microsoft.com/office/drawing/2014/main" id="{1A1BCE7C-88D9-B491-3D98-02082A1ADD33}"/>
+              </a:ext>
+            </a:extLst>
+          </p:cNvPr>
+          <p:cNvSpPr>
+            <a:spLocks noGrp="1"/>
+          </p:cNvSpPr>
+          <p:nvPr>
+            <p:ph type="title"/>
+          </p:nvPr>
         </p:nvSpPr>
         <p:spPr>
           <a:xfrm>
-            <a:off x="0" y="376"/>
-            <a:ext cx="5303520" cy="6857624"/>
+            <a:off x="839788" y="457200"/>
+            <a:ext cx="3932237" cy="1600200"/>
           </a:xfrm>
-          <a:prstGeom prst="rect">
-            <a:avLst/>
-          </a:prstGeom>
-          <a:solidFill>
-            <a:schemeClr val="accent1"/>
-          </a:solidFill>
-          <a:ln>
-            <a:noFill/>
-          </a:ln>
         </p:spPr>
-        <p:style>
-          <a:lnRef idx="2">
-            <a:schemeClr val="accent1">
-              <a:shade val="50000"/>
-            </a:schemeClr>
-          </a:lnRef>
-          <a:fillRef idx="1">
-            <a:schemeClr val="accent1"/>
-          </a:fillRef>
-          <a:effectRef idx="0">
-            <a:schemeClr val="accent1"/>
-          </a:effectRef>
-          <a:fontRef idx="minor">
-            <a:schemeClr val="lt1"/>
-          </a:fontRef>
-        </p:style>
-      </p:sp>
-      <p:sp>
-        <p:nvSpPr>
-          <p:cNvPr id="2" name="Title 1"/>
-          <p:cNvSpPr>
-            <a:spLocks noGrp="1"/>
-          </p:cNvSpPr>
-          <p:nvPr>
-            <p:ph type="title"/>
+        <p:txBody>
+          <a:bodyPr anchor="b"/>
+          <a:lstStyle>
+            <a:lvl1pPr>
+              <a:defRPr sz="3200"/>
+            </a:lvl1pPr>
+          </a:lstStyle>
+          <a:p>
+            <a:r>
+              <a:rPr lang="zh-TW" altLang="en-US"/>
+              <a:t>按一下以編輯母片標題樣式</a:t>
+            </a:r>
+            <a:endParaRPr lang="en-US"/>
+          </a:p>
+        </p:txBody>
+      </p:sp>
+      <p:sp>
+        <p:nvSpPr>
+          <p:cNvPr id="3" name="圖片版面配置區 2">
+            <a:extLst>
+              <a:ext uri="{FF2B5EF4-FFF2-40B4-BE49-F238E27FC236}">
+                <a16:creationId xmlns:a16="http://schemas.microsoft.com/office/drawing/2014/main" id="{C6D6CAED-9DD6-BEC3-FE89-3771B582CC72}"/>
+              </a:ext>
+            </a:extLst>
+          </p:cNvPr>
+          <p:cNvSpPr>
+            <a:spLocks noGrp="1"/>
+          </p:cNvSpPr>
+          <p:nvPr>
+            <p:ph type="pic" idx="1"/>
           </p:nvPr>
         </p:nvSpPr>
         <p:spPr>
           <a:xfrm>
-            <a:off x="723900" y="685800"/>
-            <a:ext cx="3855720" cy="2157884"/>
+            <a:off x="5183188" y="987425"/>
+            <a:ext cx="6172200" cy="4873625"/>
           </a:xfrm>
         </p:spPr>
         <p:txBody>
-          <a:bodyPr anchor="t">
-            <a:normAutofit/>
-          </a:bodyPr>
-          <a:lstStyle>
-            <a:lvl1pPr>
-              <a:lnSpc>
-                <a:spcPct val="84000"/>
-              </a:lnSpc>
-              <a:defRPr sz="4800" baseline="0"/>
-            </a:lvl1pPr>
-          </a:lstStyle>
-          <a:p>
-            <a:r>
-              <a:rPr lang="zh-TW" altLang="en-US"/>
-              <a:t>按一下以編輯母片標題樣式</a:t>
-            </a:r>
-            <a:endParaRPr lang="en-US" dirty="0"/>
-          </a:p>
-        </p:txBody>
-      </p:sp>
-      <p:sp>
-        <p:nvSpPr>
-          <p:cNvPr id="3" name="Picture Placeholder 2"/>
-          <p:cNvSpPr>
-            <a:spLocks noGrp="1" noChangeAspect="1"/>
-          </p:cNvSpPr>
-          <p:nvPr>
-            <p:ph type="pic" idx="1"/>
-          </p:nvPr>
-        </p:nvSpPr>
-        <p:spPr>
-          <a:xfrm>
-            <a:off x="5532120" y="0"/>
-            <a:ext cx="6659880" cy="6857999"/>
-          </a:xfrm>
-        </p:spPr>
-        <p:txBody>
-          <a:bodyPr anchor="t">
-            <a:normAutofit/>
-          </a:bodyPr>
+          <a:bodyPr/>
           <a:lstStyle>
             <a:lvl1pPr marL="0" indent="0">
               <a:buNone/>
-              <a:defRPr sz="2000"/>
+              <a:defRPr sz="3200"/>
             </a:lvl1pPr>
             <a:lvl2pPr marL="457200" indent="0">
               <a:buNone/>
-              <a:defRPr sz="2000"/>
+              <a:defRPr sz="2800"/>
             </a:lvl2pPr>
             <a:lvl3pPr marL="914400" indent="0">
               <a:buNone/>
-              <a:defRPr sz="2000"/>
+              <a:defRPr sz="2400"/>
             </a:lvl3pPr>
             <a:lvl4pPr marL="1371600" indent="0">
               <a:buNone/>
@@ -2960,17 +2608,19 @@
             </a:lvl9pPr>
           </a:lstStyle>
           <a:p>
-            <a:r>
-              <a:rPr lang="zh-TW" altLang="en-US"/>
-              <a:t>按一下圖示以新增圖片</a:t>
-            </a:r>
-            <a:endParaRPr lang="en-US" dirty="0"/>
-          </a:p>
-        </p:txBody>
-      </p:sp>
-      <p:sp>
-        <p:nvSpPr>
-          <p:cNvPr id="4" name="Text Placeholder 3"/>
+            <a:endParaRPr lang="en-US"/>
+          </a:p>
+        </p:txBody>
+      </p:sp>
+      <p:sp>
+        <p:nvSpPr>
+          <p:cNvPr id="4" name="文字版面配置區 3">
+            <a:extLst>
+              <a:ext uri="{FF2B5EF4-FFF2-40B4-BE49-F238E27FC236}">
+                <a16:creationId xmlns:a16="http://schemas.microsoft.com/office/drawing/2014/main" id="{6E7717C6-3848-EB09-F8A0-3D131BD84B18}"/>
+              </a:ext>
+            </a:extLst>
+          </p:cNvPr>
           <p:cNvSpPr>
             <a:spLocks noGrp="1"/>
           </p:cNvSpPr>
@@ -2980,23 +2630,14 @@
         </p:nvSpPr>
         <p:spPr>
           <a:xfrm>
-            <a:off x="723900" y="2855968"/>
-            <a:ext cx="3855720" cy="3011432"/>
+            <a:off x="839788" y="2057400"/>
+            <a:ext cx="3932237" cy="3811588"/>
           </a:xfrm>
         </p:spPr>
         <p:txBody>
           <a:bodyPr/>
           <a:lstStyle>
             <a:lvl1pPr marL="0" indent="0">
-              <a:lnSpc>
-                <a:spcPct val="113000"/>
-              </a:lnSpc>
-              <a:spcBef>
-                <a:spcPts val="0"/>
-              </a:spcBef>
-              <a:spcAft>
-                <a:spcPts val="1500"/>
-              </a:spcAft>
               <a:buNone/>
               <a:defRPr sz="1600"/>
             </a:lvl1pPr>
@@ -3044,7 +2685,13 @@
       </p:sp>
       <p:sp>
         <p:nvSpPr>
-          <p:cNvPr id="5" name="Date Placeholder 4"/>
+          <p:cNvPr id="5" name="日期版面配置區 4">
+            <a:extLst>
+              <a:ext uri="{FF2B5EF4-FFF2-40B4-BE49-F238E27FC236}">
+                <a16:creationId xmlns:a16="http://schemas.microsoft.com/office/drawing/2014/main" id="{9255BEE9-88F7-A46C-EB76-8B7AC10B075B}"/>
+              </a:ext>
+            </a:extLst>
+          </p:cNvPr>
           <p:cNvSpPr>
             <a:spLocks noGrp="1"/>
           </p:cNvSpPr>
@@ -3052,27 +2699,14 @@
             <p:ph type="dt" sz="half" idx="10"/>
           </p:nvPr>
         </p:nvSpPr>
-        <p:spPr>
-          <a:xfrm>
-            <a:off x="723900" y="6453386"/>
-            <a:ext cx="1204572" cy="404614"/>
-          </a:xfrm>
-        </p:spPr>
-        <p:txBody>
-          <a:bodyPr/>
-          <a:lstStyle>
-            <a:lvl1pPr>
-              <a:defRPr>
-                <a:solidFill>
-                  <a:schemeClr val="tx2"/>
-                </a:solidFill>
-              </a:defRPr>
-            </a:lvl1pPr>
-          </a:lstStyle>
+        <p:spPr/>
+        <p:txBody>
+          <a:bodyPr/>
+          <a:lstStyle/>
           <a:p>
             <a:fld id="{AE56CB72-CA00-42C8-B797-1F71B30B40C8}" type="datetimeFigureOut">
               <a:rPr lang="en-US" smtClean="0"/>
-              <a:t>6/18/2023</a:t>
+              <a:t>6/19/2023</a:t>
             </a:fld>
             <a:endParaRPr lang="en-US"/>
           </a:p>
@@ -3080,7 +2714,13 @@
       </p:sp>
       <p:sp>
         <p:nvSpPr>
-          <p:cNvPr id="6" name="Footer Placeholder 5"/>
+          <p:cNvPr id="6" name="頁尾版面配置區 5">
+            <a:extLst>
+              <a:ext uri="{FF2B5EF4-FFF2-40B4-BE49-F238E27FC236}">
+                <a16:creationId xmlns:a16="http://schemas.microsoft.com/office/drawing/2014/main" id="{DB2614EE-6359-F172-32A4-21A3646745D4}"/>
+              </a:ext>
+            </a:extLst>
+          </p:cNvPr>
           <p:cNvSpPr>
             <a:spLocks noGrp="1"/>
           </p:cNvSpPr>
@@ -3088,31 +2728,24 @@
             <p:ph type="ftr" sz="quarter" idx="11"/>
           </p:nvPr>
         </p:nvSpPr>
-        <p:spPr>
-          <a:xfrm>
-            <a:off x="2205945" y="6453386"/>
-            <a:ext cx="2373675" cy="404614"/>
-          </a:xfrm>
-        </p:spPr>
-        <p:txBody>
-          <a:bodyPr/>
-          <a:lstStyle>
-            <a:lvl1pPr>
-              <a:defRPr>
-                <a:solidFill>
-                  <a:schemeClr val="tx2"/>
-                </a:solidFill>
-              </a:defRPr>
-            </a:lvl1pPr>
-          </a:lstStyle>
-          <a:p>
-            <a:endParaRPr lang="en-US" dirty="0"/>
-          </a:p>
-        </p:txBody>
-      </p:sp>
-      <p:sp>
-        <p:nvSpPr>
-          <p:cNvPr id="7" name="Slide Number Placeholder 6"/>
+        <p:spPr/>
+        <p:txBody>
+          <a:bodyPr/>
+          <a:lstStyle/>
+          <a:p>
+            <a:endParaRPr lang="en-US"/>
+          </a:p>
+        </p:txBody>
+      </p:sp>
+      <p:sp>
+        <p:nvSpPr>
+          <p:cNvPr id="7" name="投影片編號版面配置區 6">
+            <a:extLst>
+              <a:ext uri="{FF2B5EF4-FFF2-40B4-BE49-F238E27FC236}">
+                <a16:creationId xmlns:a16="http://schemas.microsoft.com/office/drawing/2014/main" id="{95C13EB9-60D5-334A-FC85-B75ACC77C263}"/>
+              </a:ext>
+            </a:extLst>
+          </p:cNvPr>
           <p:cNvSpPr>
             <a:spLocks noGrp="1"/>
           </p:cNvSpPr>
@@ -3120,23 +2753,10 @@
             <p:ph type="sldNum" sz="quarter" idx="12"/>
           </p:nvPr>
         </p:nvSpPr>
-        <p:spPr>
-          <a:xfrm>
-            <a:off x="9883140" y="6453386"/>
-            <a:ext cx="1596292" cy="404614"/>
-          </a:xfrm>
-        </p:spPr>
-        <p:txBody>
-          <a:bodyPr/>
-          <a:lstStyle>
-            <a:lvl1pPr>
-              <a:defRPr>
-                <a:solidFill>
-                  <a:schemeClr val="tx2"/>
-                </a:solidFill>
-              </a:defRPr>
-            </a:lvl1pPr>
-          </a:lstStyle>
+        <p:spPr/>
+        <p:txBody>
+          <a:bodyPr/>
+          <a:lstStyle/>
           <a:p>
             <a:fld id="{8F3D733B-2F1E-4CDE-9271-9DDBC48C7550}" type="slidenum">
               <a:rPr lang="en-US" smtClean="0"/>
@@ -3146,48 +2766,10 @@
           </a:p>
         </p:txBody>
       </p:sp>
-      <p:sp>
-        <p:nvSpPr>
-          <p:cNvPr id="9" name="Rectangle 8" title="Divider Bar"/>
-          <p:cNvSpPr/>
-          <p:nvPr/>
-        </p:nvSpPr>
-        <p:spPr>
-          <a:xfrm>
-            <a:off x="5303520" y="376"/>
-            <a:ext cx="228600" cy="6858000"/>
-          </a:xfrm>
-          <a:prstGeom prst="rect">
-            <a:avLst/>
-          </a:prstGeom>
-          <a:solidFill>
-            <a:schemeClr val="tx2"/>
-          </a:solidFill>
-          <a:ln>
-            <a:noFill/>
-          </a:ln>
-        </p:spPr>
-        <p:style>
-          <a:lnRef idx="2">
-            <a:schemeClr val="accent1">
-              <a:shade val="50000"/>
-            </a:schemeClr>
-          </a:lnRef>
-          <a:fillRef idx="1">
-            <a:schemeClr val="accent1"/>
-          </a:fillRef>
-          <a:effectRef idx="0">
-            <a:schemeClr val="accent1"/>
-          </a:effectRef>
-          <a:fontRef idx="minor">
-            <a:schemeClr val="lt1"/>
-          </a:fontRef>
-        </p:style>
-      </p:sp>
     </p:spTree>
     <p:extLst>
       <p:ext uri="{BB962C8B-B14F-4D97-AF65-F5344CB8AC3E}">
-        <p14:creationId xmlns:p14="http://schemas.microsoft.com/office/powerpoint/2010/main" val="2120250321"/>
+        <p14:creationId xmlns:p14="http://schemas.microsoft.com/office/powerpoint/2010/main" val="3247718123"/>
       </p:ext>
     </p:extLst>
   </p:cSld>
@@ -3201,12 +2783,9 @@
 <p:sldMaster xmlns:a="http://schemas.openxmlformats.org/drawingml/2006/main" xmlns:r="http://schemas.openxmlformats.org/officeDocument/2006/relationships" xmlns:p="http://schemas.openxmlformats.org/presentationml/2006/main">
   <p:cSld>
     <p:bg>
-      <p:bgPr>
-        <a:solidFill>
-          <a:schemeClr val="bg2"/>
-        </a:solidFill>
-        <a:effectLst/>
-      </p:bgPr>
+      <p:bgRef idx="1001">
+        <a:schemeClr val="bg1"/>
+      </p:bgRef>
     </p:bg>
     <p:spTree>
       <p:nvGrpSpPr>
@@ -3224,7 +2803,13 @@
       </p:grpSpPr>
       <p:sp>
         <p:nvSpPr>
-          <p:cNvPr id="2" name="Title Placeholder 1"/>
+          <p:cNvPr id="2" name="標題版面配置區 1">
+            <a:extLst>
+              <a:ext uri="{FF2B5EF4-FFF2-40B4-BE49-F238E27FC236}">
+                <a16:creationId xmlns:a16="http://schemas.microsoft.com/office/drawing/2014/main" id="{7FB1C43C-5177-2A83-A0F5-416AD005C28F}"/>
+              </a:ext>
+            </a:extLst>
+          </p:cNvPr>
           <p:cNvSpPr>
             <a:spLocks noGrp="1"/>
           </p:cNvSpPr>
@@ -3234,15 +2819,15 @@
         </p:nvSpPr>
         <p:spPr>
           <a:xfrm>
-            <a:off x="1371600" y="685800"/>
-            <a:ext cx="9601200" cy="1485900"/>
+            <a:off x="838200" y="365125"/>
+            <a:ext cx="10515600" cy="1325563"/>
           </a:xfrm>
           <a:prstGeom prst="rect">
             <a:avLst/>
           </a:prstGeom>
         </p:spPr>
         <p:txBody>
-          <a:bodyPr vert="horz" lIns="91440" tIns="45720" rIns="91440" bIns="45720" rtlCol="0" anchor="t">
+          <a:bodyPr vert="horz" lIns="91440" tIns="45720" rIns="91440" bIns="45720" rtlCol="0" anchor="ctr">
             <a:normAutofit/>
           </a:bodyPr>
           <a:lstStyle/>
@@ -3251,13 +2836,19 @@
               <a:rPr lang="zh-TW" altLang="en-US"/>
               <a:t>按一下以編輯母片標題樣式</a:t>
             </a:r>
-            <a:endParaRPr lang="en-US" dirty="0"/>
-          </a:p>
-        </p:txBody>
-      </p:sp>
-      <p:sp>
-        <p:nvSpPr>
-          <p:cNvPr id="3" name="Text Placeholder 2"/>
+            <a:endParaRPr lang="en-US"/>
+          </a:p>
+        </p:txBody>
+      </p:sp>
+      <p:sp>
+        <p:nvSpPr>
+          <p:cNvPr id="3" name="文字版面配置區 2">
+            <a:extLst>
+              <a:ext uri="{FF2B5EF4-FFF2-40B4-BE49-F238E27FC236}">
+                <a16:creationId xmlns:a16="http://schemas.microsoft.com/office/drawing/2014/main" id="{98E5E8E4-84CC-39C2-2BA4-6088065AC30A}"/>
+              </a:ext>
+            </a:extLst>
+          </p:cNvPr>
           <p:cNvSpPr>
             <a:spLocks noGrp="1"/>
           </p:cNvSpPr>
@@ -3267,8 +2858,8 @@
         </p:nvSpPr>
         <p:spPr>
           <a:xfrm>
-            <a:off x="1371600" y="2286000"/>
-            <a:ext cx="9601200" cy="3581400"/>
+            <a:off x="838200" y="1825625"/>
+            <a:ext cx="10515600" cy="4351338"/>
           </a:xfrm>
           <a:prstGeom prst="rect">
             <a:avLst/>
@@ -3313,13 +2904,19 @@
               <a:rPr lang="zh-TW" altLang="en-US"/>
               <a:t>第五層</a:t>
             </a:r>
-            <a:endParaRPr lang="en-US" dirty="0"/>
-          </a:p>
-        </p:txBody>
-      </p:sp>
-      <p:sp>
-        <p:nvSpPr>
-          <p:cNvPr id="4" name="Date Placeholder 3"/>
+            <a:endParaRPr lang="en-US"/>
+          </a:p>
+        </p:txBody>
+      </p:sp>
+      <p:sp>
+        <p:nvSpPr>
+          <p:cNvPr id="4" name="日期版面配置區 3">
+            <a:extLst>
+              <a:ext uri="{FF2B5EF4-FFF2-40B4-BE49-F238E27FC236}">
+                <a16:creationId xmlns:a16="http://schemas.microsoft.com/office/drawing/2014/main" id="{0D889FFA-B230-9FB9-14E3-0A5A428F91B0}"/>
+              </a:ext>
+            </a:extLst>
+          </p:cNvPr>
           <p:cNvSpPr>
             <a:spLocks noGrp="1"/>
           </p:cNvSpPr>
@@ -3329,8 +2926,8 @@
         </p:nvSpPr>
         <p:spPr>
           <a:xfrm>
-            <a:off x="1390650" y="6453386"/>
-            <a:ext cx="1204572" cy="404614"/>
+            <a:off x="838200" y="6356350"/>
+            <a:ext cx="2743200" cy="365125"/>
           </a:xfrm>
           <a:prstGeom prst="rect">
             <a:avLst/>
@@ -3340,9 +2937,11 @@
           <a:bodyPr vert="horz" lIns="91440" tIns="45720" rIns="91440" bIns="45720" rtlCol="0" anchor="ctr"/>
           <a:lstStyle>
             <a:lvl1pPr algn="l">
-              <a:defRPr sz="1200" baseline="0">
+              <a:defRPr sz="1200">
                 <a:solidFill>
-                  <a:schemeClr val="tx2"/>
+                  <a:schemeClr val="tx1">
+                    <a:tint val="75000"/>
+                  </a:schemeClr>
                 </a:solidFill>
               </a:defRPr>
             </a:lvl1pPr>
@@ -3350,7 +2949,7 @@
           <a:p>
             <a:fld id="{AE56CB72-CA00-42C8-B797-1F71B30B40C8}" type="datetimeFigureOut">
               <a:rPr lang="en-US" smtClean="0"/>
-              <a:t>6/18/2023</a:t>
+              <a:t>6/19/2023</a:t>
             </a:fld>
             <a:endParaRPr lang="en-US"/>
           </a:p>
@@ -3358,7 +2957,13 @@
       </p:sp>
       <p:sp>
         <p:nvSpPr>
-          <p:cNvPr id="5" name="Footer Placeholder 4"/>
+          <p:cNvPr id="5" name="頁尾版面配置區 4">
+            <a:extLst>
+              <a:ext uri="{FF2B5EF4-FFF2-40B4-BE49-F238E27FC236}">
+                <a16:creationId xmlns:a16="http://schemas.microsoft.com/office/drawing/2014/main" id="{45B607F5-0DD9-014D-28BD-602CDD585B78}"/>
+              </a:ext>
+            </a:extLst>
+          </p:cNvPr>
           <p:cNvSpPr>
             <a:spLocks noGrp="1"/>
           </p:cNvSpPr>
@@ -3368,8 +2973,8 @@
         </p:nvSpPr>
         <p:spPr>
           <a:xfrm>
-            <a:off x="2893564" y="6453386"/>
-            <a:ext cx="6280830" cy="404614"/>
+            <a:off x="4038600" y="6356350"/>
+            <a:ext cx="4114800" cy="365125"/>
           </a:xfrm>
           <a:prstGeom prst="rect">
             <a:avLst/>
@@ -3378,10 +2983,12 @@
         <p:txBody>
           <a:bodyPr vert="horz" lIns="91440" tIns="45720" rIns="91440" bIns="45720" rtlCol="0" anchor="ctr"/>
           <a:lstStyle>
-            <a:lvl1pPr algn="l">
-              <a:defRPr sz="1200" baseline="0">
+            <a:lvl1pPr algn="ctr">
+              <a:defRPr sz="1200">
                 <a:solidFill>
-                  <a:schemeClr val="tx2"/>
+                  <a:schemeClr val="tx1">
+                    <a:tint val="75000"/>
+                  </a:schemeClr>
                 </a:solidFill>
               </a:defRPr>
             </a:lvl1pPr>
@@ -3393,7 +3000,13 @@
       </p:sp>
       <p:sp>
         <p:nvSpPr>
-          <p:cNvPr id="6" name="Slide Number Placeholder 5"/>
+          <p:cNvPr id="6" name="投影片編號版面配置區 5">
+            <a:extLst>
+              <a:ext uri="{FF2B5EF4-FFF2-40B4-BE49-F238E27FC236}">
+                <a16:creationId xmlns:a16="http://schemas.microsoft.com/office/drawing/2014/main" id="{5C65B511-6EDC-585C-55D8-25B4B99A26FB}"/>
+              </a:ext>
+            </a:extLst>
+          </p:cNvPr>
           <p:cNvSpPr>
             <a:spLocks noGrp="1"/>
           </p:cNvSpPr>
@@ -3403,8 +3016,8 @@
         </p:nvSpPr>
         <p:spPr>
           <a:xfrm>
-            <a:off x="9472736" y="6453386"/>
-            <a:ext cx="1596292" cy="404614"/>
+            <a:off x="8610600" y="6356350"/>
+            <a:ext cx="2743200" cy="365125"/>
           </a:xfrm>
           <a:prstGeom prst="rect">
             <a:avLst/>
@@ -3414,9 +3027,11 @@
           <a:bodyPr vert="horz" lIns="91440" tIns="45720" rIns="91440" bIns="45720" rtlCol="0" anchor="ctr"/>
           <a:lstStyle>
             <a:lvl1pPr algn="r">
-              <a:defRPr sz="1200" baseline="0">
+              <a:defRPr sz="1200">
                 <a:solidFill>
-                  <a:schemeClr val="tx2"/>
+                  <a:schemeClr val="tx1">
+                    <a:tint val="75000"/>
+                  </a:schemeClr>
                 </a:solidFill>
               </a:defRPr>
             </a:lvl1pPr>
@@ -3430,78 +3045,40 @@
           </a:p>
         </p:txBody>
       </p:sp>
-      <p:sp>
-        <p:nvSpPr>
-          <p:cNvPr id="9" name="Rectangle 8" title="Side bar"/>
-          <p:cNvSpPr/>
-          <p:nvPr/>
-        </p:nvSpPr>
-        <p:spPr>
-          <a:xfrm>
-            <a:off x="478095" y="376"/>
-            <a:ext cx="228600" cy="6858000"/>
-          </a:xfrm>
-          <a:prstGeom prst="rect">
-            <a:avLst/>
-          </a:prstGeom>
-          <a:solidFill>
-            <a:schemeClr val="tx2"/>
-          </a:solidFill>
-          <a:ln>
-            <a:noFill/>
-          </a:ln>
-        </p:spPr>
-        <p:style>
-          <a:lnRef idx="2">
-            <a:schemeClr val="accent1">
-              <a:shade val="50000"/>
-            </a:schemeClr>
-          </a:lnRef>
-          <a:fillRef idx="1">
-            <a:schemeClr val="accent1"/>
-          </a:fillRef>
-          <a:effectRef idx="0">
-            <a:schemeClr val="accent1"/>
-          </a:effectRef>
-          <a:fontRef idx="minor">
-            <a:schemeClr val="lt1"/>
-          </a:fontRef>
-        </p:style>
-      </p:sp>
     </p:spTree>
     <p:extLst>
       <p:ext uri="{BB962C8B-B14F-4D97-AF65-F5344CB8AC3E}">
-        <p14:creationId xmlns:p14="http://schemas.microsoft.com/office/powerpoint/2010/main" val="932399076"/>
+        <p14:creationId xmlns:p14="http://schemas.microsoft.com/office/powerpoint/2010/main" val="611756255"/>
       </p:ext>
     </p:extLst>
   </p:cSld>
   <p:clrMap bg1="lt1" tx1="dk1" bg2="lt2" tx2="dk2" accent1="accent1" accent2="accent2" accent3="accent3" accent4="accent4" accent5="accent5" accent6="accent6" hlink="hlink" folHlink="folHlink"/>
   <p:sldLayoutIdLst>
-    <p:sldLayoutId id="2147483787" r:id="rId1"/>
-    <p:sldLayoutId id="2147483788" r:id="rId2"/>
-    <p:sldLayoutId id="2147483789" r:id="rId3"/>
-    <p:sldLayoutId id="2147483790" r:id="rId4"/>
-    <p:sldLayoutId id="2147483791" r:id="rId5"/>
-    <p:sldLayoutId id="2147483792" r:id="rId6"/>
-    <p:sldLayoutId id="2147483793" r:id="rId7"/>
-    <p:sldLayoutId id="2147483794" r:id="rId8"/>
-    <p:sldLayoutId id="2147483795" r:id="rId9"/>
-    <p:sldLayoutId id="2147483796" r:id="rId10"/>
-    <p:sldLayoutId id="2147483797" r:id="rId11"/>
+    <p:sldLayoutId id="2147483823" r:id="rId1"/>
+    <p:sldLayoutId id="2147483824" r:id="rId2"/>
+    <p:sldLayoutId id="2147483825" r:id="rId3"/>
+    <p:sldLayoutId id="2147483826" r:id="rId4"/>
+    <p:sldLayoutId id="2147483827" r:id="rId5"/>
+    <p:sldLayoutId id="2147483828" r:id="rId6"/>
+    <p:sldLayoutId id="2147483829" r:id="rId7"/>
+    <p:sldLayoutId id="2147483830" r:id="rId8"/>
+    <p:sldLayoutId id="2147483831" r:id="rId9"/>
+    <p:sldLayoutId id="2147483832" r:id="rId10"/>
+    <p:sldLayoutId id="2147483833" r:id="rId11"/>
   </p:sldLayoutIdLst>
   <p:txStyles>
     <p:titleStyle>
       <a:lvl1pPr algn="l" defTabSz="914400" rtl="0" eaLnBrk="1" latinLnBrk="0" hangingPunct="1">
         <a:lnSpc>
-          <a:spcPct val="89000"/>
+          <a:spcPct val="90000"/>
         </a:lnSpc>
         <a:spcBef>
           <a:spcPct val="0"/>
         </a:spcBef>
         <a:buNone/>
-        <a:defRPr sz="4400" kern="1200" baseline="0">
+        <a:defRPr sz="4400" kern="1200">
           <a:solidFill>
-            <a:schemeClr val="tx2"/>
+            <a:schemeClr val="tx1"/>
           </a:solidFill>
           <a:latin typeface="+mj-lt"/>
           <a:ea typeface="+mj-ea"/>
@@ -3510,189 +3087,162 @@
       </a:lvl1pPr>
     </p:titleStyle>
     <p:bodyStyle>
-      <a:lvl1pPr marL="384048" indent="-384048" algn="l" defTabSz="914400" rtl="0" eaLnBrk="1" latinLnBrk="0" hangingPunct="1">
+      <a:lvl1pPr marL="228600" indent="-228600" algn="l" defTabSz="914400" rtl="0" eaLnBrk="1" latinLnBrk="0" hangingPunct="1">
         <a:lnSpc>
-          <a:spcPct val="94000"/>
+          <a:spcPct val="90000"/>
         </a:lnSpc>
         <a:spcBef>
           <a:spcPts val="1000"/>
         </a:spcBef>
-        <a:spcAft>
-          <a:spcPts val="200"/>
-        </a:spcAft>
-        <a:buFont typeface="Franklin Gothic Book" panose="020B0503020102020204" pitchFamily="34" charset="0"/>
-        <a:buChar char="■"/>
-        <a:defRPr sz="2000" kern="1200" baseline="0">
+        <a:buFont typeface="Arial" panose="020B0604020202020204" pitchFamily="34" charset="0"/>
+        <a:buChar char="•"/>
+        <a:defRPr sz="2800" kern="1200">
           <a:solidFill>
-            <a:schemeClr val="tx2"/>
+            <a:schemeClr val="tx1"/>
           </a:solidFill>
           <a:latin typeface="+mn-lt"/>
           <a:ea typeface="+mn-ea"/>
           <a:cs typeface="+mn-cs"/>
         </a:defRPr>
       </a:lvl1pPr>
-      <a:lvl2pPr marL="914400" indent="-384048" algn="l" defTabSz="914400" rtl="0" eaLnBrk="1" latinLnBrk="0" hangingPunct="1">
+      <a:lvl2pPr marL="685800" indent="-228600" algn="l" defTabSz="914400" rtl="0" eaLnBrk="1" latinLnBrk="0" hangingPunct="1">
         <a:lnSpc>
-          <a:spcPct val="94000"/>
+          <a:spcPct val="90000"/>
         </a:lnSpc>
         <a:spcBef>
           <a:spcPts val="500"/>
         </a:spcBef>
-        <a:spcAft>
-          <a:spcPts val="200"/>
-        </a:spcAft>
-        <a:buFont typeface="Franklin Gothic Book" panose="020B0503020102020204" pitchFamily="34" charset="0"/>
-        <a:buChar char="–"/>
-        <a:defRPr sz="2000" i="1" kern="1200" baseline="0">
+        <a:buFont typeface="Arial" panose="020B0604020202020204" pitchFamily="34" charset="0"/>
+        <a:buChar char="•"/>
+        <a:defRPr sz="2400" kern="1200">
           <a:solidFill>
-            <a:schemeClr val="tx2"/>
+            <a:schemeClr val="tx1"/>
           </a:solidFill>
           <a:latin typeface="+mn-lt"/>
           <a:ea typeface="+mn-ea"/>
           <a:cs typeface="+mn-cs"/>
         </a:defRPr>
       </a:lvl2pPr>
-      <a:lvl3pPr marL="1371600" indent="-384048" algn="l" defTabSz="914400" rtl="0" eaLnBrk="1" latinLnBrk="0" hangingPunct="1">
+      <a:lvl3pPr marL="1143000" indent="-228600" algn="l" defTabSz="914400" rtl="0" eaLnBrk="1" latinLnBrk="0" hangingPunct="1">
         <a:lnSpc>
-          <a:spcPct val="94000"/>
+          <a:spcPct val="90000"/>
         </a:lnSpc>
         <a:spcBef>
           <a:spcPts val="500"/>
         </a:spcBef>
-        <a:spcAft>
-          <a:spcPts val="200"/>
-        </a:spcAft>
-        <a:buFont typeface="Franklin Gothic Book" panose="020B0503020102020204" pitchFamily="34" charset="0"/>
-        <a:buChar char="■"/>
-        <a:defRPr sz="1800" kern="1200" baseline="0">
+        <a:buFont typeface="Arial" panose="020B0604020202020204" pitchFamily="34" charset="0"/>
+        <a:buChar char="•"/>
+        <a:defRPr sz="2000" kern="1200">
           <a:solidFill>
-            <a:schemeClr val="tx2"/>
+            <a:schemeClr val="tx1"/>
           </a:solidFill>
           <a:latin typeface="+mn-lt"/>
           <a:ea typeface="+mn-ea"/>
           <a:cs typeface="+mn-cs"/>
         </a:defRPr>
       </a:lvl3pPr>
-      <a:lvl4pPr marL="1828800" indent="-384048" algn="l" defTabSz="914400" rtl="0" eaLnBrk="1" latinLnBrk="0" hangingPunct="1">
+      <a:lvl4pPr marL="1600200" indent="-228600" algn="l" defTabSz="914400" rtl="0" eaLnBrk="1" latinLnBrk="0" hangingPunct="1">
         <a:lnSpc>
-          <a:spcPct val="94000"/>
+          <a:spcPct val="90000"/>
         </a:lnSpc>
         <a:spcBef>
           <a:spcPts val="500"/>
         </a:spcBef>
-        <a:spcAft>
-          <a:spcPts val="200"/>
-        </a:spcAft>
-        <a:buFont typeface="Franklin Gothic Book" panose="020B0503020102020204" pitchFamily="34" charset="0"/>
-        <a:buChar char="–"/>
-        <a:defRPr sz="1800" i="1" kern="1200" baseline="0">
+        <a:buFont typeface="Arial" panose="020B0604020202020204" pitchFamily="34" charset="0"/>
+        <a:buChar char="•"/>
+        <a:defRPr sz="1800" kern="1200">
           <a:solidFill>
-            <a:schemeClr val="tx2"/>
+            <a:schemeClr val="tx1"/>
           </a:solidFill>
           <a:latin typeface="+mn-lt"/>
           <a:ea typeface="+mn-ea"/>
           <a:cs typeface="+mn-cs"/>
         </a:defRPr>
       </a:lvl4pPr>
-      <a:lvl5pPr marL="2286000" indent="-384048" algn="l" defTabSz="914400" rtl="0" eaLnBrk="1" latinLnBrk="0" hangingPunct="1">
+      <a:lvl5pPr marL="2057400" indent="-228600" algn="l" defTabSz="914400" rtl="0" eaLnBrk="1" latinLnBrk="0" hangingPunct="1">
         <a:lnSpc>
-          <a:spcPct val="94000"/>
+          <a:spcPct val="90000"/>
         </a:lnSpc>
         <a:spcBef>
           <a:spcPts val="500"/>
         </a:spcBef>
-        <a:spcAft>
-          <a:spcPts val="200"/>
-        </a:spcAft>
-        <a:buFont typeface="Franklin Gothic Book" panose="020B0503020102020204" pitchFamily="34" charset="0"/>
-        <a:buChar char="■"/>
-        <a:defRPr sz="1600" kern="1200" baseline="0">
+        <a:buFont typeface="Arial" panose="020B0604020202020204" pitchFamily="34" charset="0"/>
+        <a:buChar char="•"/>
+        <a:defRPr sz="1800" kern="1200">
           <a:solidFill>
-            <a:schemeClr val="tx2"/>
+            <a:schemeClr val="tx1"/>
           </a:solidFill>
           <a:latin typeface="+mn-lt"/>
           <a:ea typeface="+mn-ea"/>
           <a:cs typeface="+mn-cs"/>
         </a:defRPr>
       </a:lvl5pPr>
-      <a:lvl6pPr marL="2743200" indent="-384048" algn="l" defTabSz="914400" rtl="0" eaLnBrk="1" latinLnBrk="0" hangingPunct="1">
+      <a:lvl6pPr marL="2514600" indent="-228600" algn="l" defTabSz="914400" rtl="0" eaLnBrk="1" latinLnBrk="0" hangingPunct="1">
         <a:lnSpc>
-          <a:spcPct val="94000"/>
+          <a:spcPct val="90000"/>
         </a:lnSpc>
         <a:spcBef>
           <a:spcPts val="500"/>
         </a:spcBef>
-        <a:spcAft>
-          <a:spcPts val="200"/>
-        </a:spcAft>
-        <a:buFont typeface="Franklin Gothic Book" panose="020B0503020102020204" pitchFamily="34" charset="0"/>
-        <a:buChar char="–"/>
-        <a:defRPr sz="1600" i="1" kern="1200" baseline="0">
+        <a:buFont typeface="Arial" panose="020B0604020202020204" pitchFamily="34" charset="0"/>
+        <a:buChar char="•"/>
+        <a:defRPr sz="1800" kern="1200">
           <a:solidFill>
-            <a:schemeClr val="tx2"/>
+            <a:schemeClr val="tx1"/>
           </a:solidFill>
           <a:latin typeface="+mn-lt"/>
           <a:ea typeface="+mn-ea"/>
           <a:cs typeface="+mn-cs"/>
         </a:defRPr>
       </a:lvl6pPr>
-      <a:lvl7pPr marL="3200400" indent="-384048" algn="l" defTabSz="914400" rtl="0" eaLnBrk="1" latinLnBrk="0" hangingPunct="1">
+      <a:lvl7pPr marL="2971800" indent="-228600" algn="l" defTabSz="914400" rtl="0" eaLnBrk="1" latinLnBrk="0" hangingPunct="1">
         <a:lnSpc>
-          <a:spcPct val="94000"/>
+          <a:spcPct val="90000"/>
         </a:lnSpc>
         <a:spcBef>
           <a:spcPts val="500"/>
         </a:spcBef>
-        <a:spcAft>
-          <a:spcPts val="200"/>
-        </a:spcAft>
-        <a:buFont typeface="Franklin Gothic Book" panose="020B0503020102020204" pitchFamily="34" charset="0"/>
-        <a:buChar char="■"/>
-        <a:defRPr sz="1400" kern="1200" baseline="0">
+        <a:buFont typeface="Arial" panose="020B0604020202020204" pitchFamily="34" charset="0"/>
+        <a:buChar char="•"/>
+        <a:defRPr sz="1800" kern="1200">
           <a:solidFill>
-            <a:schemeClr val="tx2"/>
+            <a:schemeClr val="tx1"/>
           </a:solidFill>
           <a:latin typeface="+mn-lt"/>
           <a:ea typeface="+mn-ea"/>
           <a:cs typeface="+mn-cs"/>
         </a:defRPr>
       </a:lvl7pPr>
-      <a:lvl8pPr marL="3657600" indent="-384048" algn="l" defTabSz="914400" rtl="0" eaLnBrk="1" latinLnBrk="0" hangingPunct="1">
+      <a:lvl8pPr marL="3429000" indent="-228600" algn="l" defTabSz="914400" rtl="0" eaLnBrk="1" latinLnBrk="0" hangingPunct="1">
         <a:lnSpc>
-          <a:spcPct val="94000"/>
+          <a:spcPct val="90000"/>
         </a:lnSpc>
         <a:spcBef>
           <a:spcPts val="500"/>
         </a:spcBef>
-        <a:spcAft>
-          <a:spcPts val="200"/>
-        </a:spcAft>
-        <a:buFont typeface="Franklin Gothic Book" panose="020B0503020102020204" pitchFamily="34" charset="0"/>
-        <a:buChar char="–"/>
-        <a:defRPr sz="1400" i="1" kern="1200" baseline="0">
+        <a:buFont typeface="Arial" panose="020B0604020202020204" pitchFamily="34" charset="0"/>
+        <a:buChar char="•"/>
+        <a:defRPr sz="1800" kern="1200">
           <a:solidFill>
-            <a:schemeClr val="tx2"/>
+            <a:schemeClr val="tx1"/>
           </a:solidFill>
           <a:latin typeface="+mn-lt"/>
           <a:ea typeface="+mn-ea"/>
           <a:cs typeface="+mn-cs"/>
         </a:defRPr>
       </a:lvl8pPr>
-      <a:lvl9pPr marL="4114800" indent="-384048" algn="l" defTabSz="914400" rtl="0" eaLnBrk="1" latinLnBrk="0" hangingPunct="1">
+      <a:lvl9pPr marL="3886200" indent="-228600" algn="l" defTabSz="914400" rtl="0" eaLnBrk="1" latinLnBrk="0" hangingPunct="1">
         <a:lnSpc>
-          <a:spcPct val="94000"/>
+          <a:spcPct val="90000"/>
         </a:lnSpc>
         <a:spcBef>
           <a:spcPts val="500"/>
         </a:spcBef>
-        <a:spcAft>
-          <a:spcPts val="200"/>
-        </a:spcAft>
-        <a:buFont typeface="Franklin Gothic Book" panose="020B0503020102020204" pitchFamily="34" charset="0"/>
-        <a:buChar char="■"/>
-        <a:defRPr sz="1400" kern="1200" baseline="0">
+        <a:buFont typeface="Arial" panose="020B0604020202020204" pitchFamily="34" charset="0"/>
+        <a:buChar char="•"/>
+        <a:defRPr sz="1800" kern="1200">
           <a:solidFill>
-            <a:schemeClr val="tx2"/>
+            <a:schemeClr val="tx1"/>
           </a:solidFill>
           <a:latin typeface="+mn-lt"/>
           <a:ea typeface="+mn-ea"/>
@@ -3798,48 +3348,7 @@
   </p:txStyles>
   <p:extLst>
     <p:ext uri="{27BBF7A9-308A-43DC-89C8-2F10F3537804}">
-      <p15:sldGuideLst xmlns:p15="http://schemas.microsoft.com/office/powerpoint/2012/main">
-        <p15:guide id="3" orient="horz" pos="1368">
-          <p15:clr>
-            <a:srgbClr val="F26B43"/>
-          </p15:clr>
-        </p15:guide>
-        <p15:guide id="4" orient="horz" pos="1440">
-          <p15:clr>
-            <a:srgbClr val="F26B43"/>
-          </p15:clr>
-        </p15:guide>
-        <p15:guide id="6" orient="horz" pos="3696">
-          <p15:clr>
-            <a:srgbClr val="F26B43"/>
-          </p15:clr>
-        </p15:guide>
-        <p15:guide id="7" orient="horz" pos="432">
-          <p15:clr>
-            <a:srgbClr val="F26B43"/>
-          </p15:clr>
-        </p15:guide>
-        <p15:guide id="8" orient="horz" pos="1512">
-          <p15:clr>
-            <a:srgbClr val="F26B43"/>
-          </p15:clr>
-        </p15:guide>
-        <p15:guide id="9" pos="6912">
-          <p15:clr>
-            <a:srgbClr val="F26B43"/>
-          </p15:clr>
-        </p15:guide>
-        <p15:guide id="10" pos="936">
-          <p15:clr>
-            <a:srgbClr val="F26B43"/>
-          </p15:clr>
-        </p15:guide>
-        <p15:guide id="11" pos="864">
-          <p15:clr>
-            <a:srgbClr val="F26B43"/>
-          </p15:clr>
-        </p15:guide>
-      </p15:sldGuideLst>
+      <p15:sldGuideLst xmlns:p15="http://schemas.microsoft.com/office/powerpoint/2012/main"/>
     </p:ext>
   </p:extLst>
 </p:sldMaster>
@@ -3880,14 +3389,16 @@
         </p:nvSpPr>
         <p:spPr/>
         <p:txBody>
-          <a:bodyPr/>
-          <a:lstStyle/>
-          <a:p>
-            <a:r>
-              <a:rPr lang="en-US" altLang="zh-TW" dirty="0"/>
-              <a:t>Mini Project 3 – Mini Chess</a:t>
-            </a:r>
-            <a:endParaRPr lang="en-US" dirty="0"/>
+          <a:bodyPr>
+            <a:normAutofit/>
+          </a:bodyPr>
+          <a:lstStyle/>
+          <a:p>
+            <a:r>
+              <a:rPr lang="en-US" altLang="zh-TW" sz="8000" dirty="0"/>
+              <a:t>Mini Chess</a:t>
+            </a:r>
+            <a:endParaRPr lang="en-US" sz="8000" dirty="0"/>
           </a:p>
         </p:txBody>
       </p:sp>
@@ -3959,6 +3470,535 @@
           <p:cNvPr id="2" name="標題 1">
             <a:extLst>
               <a:ext uri="{FF2B5EF4-FFF2-40B4-BE49-F238E27FC236}">
+                <a16:creationId xmlns:a16="http://schemas.microsoft.com/office/drawing/2014/main" id="{762A423E-BF8F-E3C9-521E-1983BDD98AEA}"/>
+              </a:ext>
+            </a:extLst>
+          </p:cNvPr>
+          <p:cNvSpPr>
+            <a:spLocks noGrp="1"/>
+          </p:cNvSpPr>
+          <p:nvPr>
+            <p:ph type="title"/>
+          </p:nvPr>
+        </p:nvSpPr>
+        <p:spPr/>
+        <p:txBody>
+          <a:bodyPr/>
+          <a:lstStyle/>
+          <a:p>
+            <a:r>
+              <a:rPr lang="en-US" altLang="zh-TW" dirty="0"/>
+              <a:t>State Value</a:t>
+            </a:r>
+            <a:endParaRPr lang="en-US" dirty="0"/>
+          </a:p>
+        </p:txBody>
+      </p:sp>
+      <p:sp>
+        <p:nvSpPr>
+          <p:cNvPr id="3" name="內容版面配置區 2">
+            <a:extLst>
+              <a:ext uri="{FF2B5EF4-FFF2-40B4-BE49-F238E27FC236}">
+                <a16:creationId xmlns:a16="http://schemas.microsoft.com/office/drawing/2014/main" id="{279C4EB6-BAE8-05D8-0D25-E0C7FEED3C52}"/>
+              </a:ext>
+            </a:extLst>
+          </p:cNvPr>
+          <p:cNvSpPr>
+            <a:spLocks noGrp="1"/>
+          </p:cNvSpPr>
+          <p:nvPr>
+            <p:ph idx="1"/>
+          </p:nvPr>
+        </p:nvSpPr>
+        <p:spPr/>
+        <p:txBody>
+          <a:bodyPr/>
+          <a:lstStyle/>
+          <a:p>
+            <a:r>
+              <a:rPr lang="zh-TW" altLang="en-US" dirty="0"/>
+              <a:t>判斷一個棋盤的好壞</a:t>
+            </a:r>
+            <a:endParaRPr lang="en-US" altLang="zh-TW" dirty="0"/>
+          </a:p>
+          <a:p>
+            <a:r>
+              <a:rPr lang="zh-TW" altLang="en-US" dirty="0"/>
+              <a:t>我方值為正，敵方值為負</a:t>
+            </a:r>
+            <a:endParaRPr lang="en-US" altLang="zh-TW" dirty="0"/>
+          </a:p>
+        </p:txBody>
+      </p:sp>
+      <p:graphicFrame>
+        <p:nvGraphicFramePr>
+          <p:cNvPr id="4" name="表格 4">
+            <a:extLst>
+              <a:ext uri="{FF2B5EF4-FFF2-40B4-BE49-F238E27FC236}">
+                <a16:creationId xmlns:a16="http://schemas.microsoft.com/office/drawing/2014/main" id="{49CE0714-5772-D3E9-3F18-FFA5E2309D80}"/>
+              </a:ext>
+            </a:extLst>
+          </p:cNvPr>
+          <p:cNvGraphicFramePr>
+            <a:graphicFrameLocks noGrp="1"/>
+          </p:cNvGraphicFramePr>
+          <p:nvPr>
+            <p:extLst>
+              <p:ext uri="{D42A27DB-BD31-4B8C-83A1-F6EECF244321}">
+                <p14:modId xmlns:p14="http://schemas.microsoft.com/office/powerpoint/2010/main" val="2014086724"/>
+              </p:ext>
+            </p:extLst>
+          </p:nvPr>
+        </p:nvGraphicFramePr>
+        <p:xfrm>
+          <a:off x="838199" y="3324856"/>
+          <a:ext cx="10515600" cy="2104394"/>
+        </p:xfrm>
+        <a:graphic>
+          <a:graphicData uri="http://schemas.openxmlformats.org/drawingml/2006/table">
+            <a:tbl>
+              <a:tblPr firstRow="1" bandRow="1">
+                <a:tableStyleId>{5C22544A-7EE6-4342-B048-85BDC9FD1C3A}</a:tableStyleId>
+              </a:tblPr>
+              <a:tblGrid>
+                <a:gridCol w="1752600">
+                  <a:extLst>
+                    <a:ext uri="{9D8B030D-6E8A-4147-A177-3AD203B41FA5}">
+                      <a16:colId xmlns:a16="http://schemas.microsoft.com/office/drawing/2014/main" val="4094161767"/>
+                    </a:ext>
+                  </a:extLst>
+                </a:gridCol>
+                <a:gridCol w="1752600">
+                  <a:extLst>
+                    <a:ext uri="{9D8B030D-6E8A-4147-A177-3AD203B41FA5}">
+                      <a16:colId xmlns:a16="http://schemas.microsoft.com/office/drawing/2014/main" val="3804510648"/>
+                    </a:ext>
+                  </a:extLst>
+                </a:gridCol>
+                <a:gridCol w="1752600">
+                  <a:extLst>
+                    <a:ext uri="{9D8B030D-6E8A-4147-A177-3AD203B41FA5}">
+                      <a16:colId xmlns:a16="http://schemas.microsoft.com/office/drawing/2014/main" val="2900272423"/>
+                    </a:ext>
+                  </a:extLst>
+                </a:gridCol>
+                <a:gridCol w="1752600">
+                  <a:extLst>
+                    <a:ext uri="{9D8B030D-6E8A-4147-A177-3AD203B41FA5}">
+                      <a16:colId xmlns:a16="http://schemas.microsoft.com/office/drawing/2014/main" val="2132571412"/>
+                    </a:ext>
+                  </a:extLst>
+                </a:gridCol>
+                <a:gridCol w="1752600">
+                  <a:extLst>
+                    <a:ext uri="{9D8B030D-6E8A-4147-A177-3AD203B41FA5}">
+                      <a16:colId xmlns:a16="http://schemas.microsoft.com/office/drawing/2014/main" val="135600658"/>
+                    </a:ext>
+                  </a:extLst>
+                </a:gridCol>
+                <a:gridCol w="1752600">
+                  <a:extLst>
+                    <a:ext uri="{9D8B030D-6E8A-4147-A177-3AD203B41FA5}">
+                      <a16:colId xmlns:a16="http://schemas.microsoft.com/office/drawing/2014/main" val="2067695160"/>
+                    </a:ext>
+                  </a:extLst>
+                </a:gridCol>
+              </a:tblGrid>
+              <a:tr h="1052197">
+                <a:tc>
+                  <a:txBody>
+                    <a:bodyPr/>
+                    <a:lstStyle/>
+                    <a:p>
+                      <a:pPr algn="ctr"/>
+                      <a:r>
+                        <a:rPr lang="en-US" sz="2400" dirty="0"/>
+                        <a:t>King</a:t>
+                      </a:r>
+                    </a:p>
+                  </a:txBody>
+                  <a:tcPr anchor="ctr"/>
+                </a:tc>
+                <a:tc>
+                  <a:txBody>
+                    <a:bodyPr/>
+                    <a:lstStyle/>
+                    <a:p>
+                      <a:pPr algn="ctr"/>
+                      <a:r>
+                        <a:rPr lang="en-US" altLang="zh-TW" sz="2400" dirty="0"/>
+                        <a:t>Queen</a:t>
+                      </a:r>
+                      <a:endParaRPr lang="en-US" sz="2400" dirty="0"/>
+                    </a:p>
+                  </a:txBody>
+                  <a:tcPr anchor="ctr"/>
+                </a:tc>
+                <a:tc>
+                  <a:txBody>
+                    <a:bodyPr/>
+                    <a:lstStyle/>
+                    <a:p>
+                      <a:pPr algn="ctr"/>
+                      <a:r>
+                        <a:rPr lang="en-US" sz="2400" dirty="0"/>
+                        <a:t>Bishop</a:t>
+                      </a:r>
+                    </a:p>
+                  </a:txBody>
+                  <a:tcPr anchor="ctr"/>
+                </a:tc>
+                <a:tc>
+                  <a:txBody>
+                    <a:bodyPr/>
+                    <a:lstStyle/>
+                    <a:p>
+                      <a:pPr algn="ctr"/>
+                      <a:r>
+                        <a:rPr lang="en-US" sz="2400" dirty="0"/>
+                        <a:t>Knight</a:t>
+                      </a:r>
+                    </a:p>
+                  </a:txBody>
+                  <a:tcPr anchor="ctr"/>
+                </a:tc>
+                <a:tc>
+                  <a:txBody>
+                    <a:bodyPr/>
+                    <a:lstStyle/>
+                    <a:p>
+                      <a:pPr algn="ctr"/>
+                      <a:r>
+                        <a:rPr lang="en-US" sz="2400" dirty="0"/>
+                        <a:t>Rook</a:t>
+                      </a:r>
+                    </a:p>
+                  </a:txBody>
+                  <a:tcPr anchor="ctr"/>
+                </a:tc>
+                <a:tc>
+                  <a:txBody>
+                    <a:bodyPr/>
+                    <a:lstStyle/>
+                    <a:p>
+                      <a:pPr algn="ctr"/>
+                      <a:r>
+                        <a:rPr lang="en-US" sz="2400" dirty="0"/>
+                        <a:t>Pawn</a:t>
+                      </a:r>
+                    </a:p>
+                  </a:txBody>
+                  <a:tcPr anchor="ctr"/>
+                </a:tc>
+                <a:extLst>
+                  <a:ext uri="{0D108BD9-81ED-4DB2-BD59-A6C34878D82A}">
+                    <a16:rowId xmlns:a16="http://schemas.microsoft.com/office/drawing/2014/main" val="2556963495"/>
+                  </a:ext>
+                </a:extLst>
+              </a:tr>
+              <a:tr h="1052197">
+                <a:tc>
+                  <a:txBody>
+                    <a:bodyPr/>
+                    <a:lstStyle/>
+                    <a:p>
+                      <a:pPr algn="ctr"/>
+                      <a:r>
+                        <a:rPr lang="en-US" sz="2400" dirty="0"/>
+                        <a:t>200000</a:t>
+                      </a:r>
+                    </a:p>
+                  </a:txBody>
+                  <a:tcPr anchor="ctr"/>
+                </a:tc>
+                <a:tc>
+                  <a:txBody>
+                    <a:bodyPr/>
+                    <a:lstStyle/>
+                    <a:p>
+                      <a:pPr algn="ctr"/>
+                      <a:r>
+                        <a:rPr lang="en-US" sz="2400" dirty="0"/>
+                        <a:t>900</a:t>
+                      </a:r>
+                    </a:p>
+                  </a:txBody>
+                  <a:tcPr anchor="ctr"/>
+                </a:tc>
+                <a:tc>
+                  <a:txBody>
+                    <a:bodyPr/>
+                    <a:lstStyle/>
+                    <a:p>
+                      <a:pPr algn="ctr"/>
+                      <a:r>
+                        <a:rPr lang="en-US" sz="2400" dirty="0"/>
+                        <a:t>330</a:t>
+                      </a:r>
+                    </a:p>
+                  </a:txBody>
+                  <a:tcPr anchor="ctr"/>
+                </a:tc>
+                <a:tc>
+                  <a:txBody>
+                    <a:bodyPr/>
+                    <a:lstStyle/>
+                    <a:p>
+                      <a:pPr algn="ctr"/>
+                      <a:r>
+                        <a:rPr lang="en-US" sz="2400" dirty="0"/>
+                        <a:t>320</a:t>
+                      </a:r>
+                    </a:p>
+                  </a:txBody>
+                  <a:tcPr anchor="ctr"/>
+                </a:tc>
+                <a:tc>
+                  <a:txBody>
+                    <a:bodyPr/>
+                    <a:lstStyle/>
+                    <a:p>
+                      <a:pPr algn="ctr"/>
+                      <a:r>
+                        <a:rPr lang="en-US" sz="2400" dirty="0"/>
+                        <a:t>500</a:t>
+                      </a:r>
+                    </a:p>
+                  </a:txBody>
+                  <a:tcPr anchor="ctr"/>
+                </a:tc>
+                <a:tc>
+                  <a:txBody>
+                    <a:bodyPr/>
+                    <a:lstStyle/>
+                    <a:p>
+                      <a:pPr algn="ctr"/>
+                      <a:r>
+                        <a:rPr lang="en-US" sz="2400" dirty="0"/>
+                        <a:t>100</a:t>
+                      </a:r>
+                    </a:p>
+                  </a:txBody>
+                  <a:tcPr anchor="ctr"/>
+                </a:tc>
+                <a:extLst>
+                  <a:ext uri="{0D108BD9-81ED-4DB2-BD59-A6C34878D82A}">
+                    <a16:rowId xmlns:a16="http://schemas.microsoft.com/office/drawing/2014/main" val="409550211"/>
+                  </a:ext>
+                </a:extLst>
+              </a:tr>
+            </a:tbl>
+          </a:graphicData>
+        </a:graphic>
+      </p:graphicFrame>
+    </p:spTree>
+    <p:extLst>
+      <p:ext uri="{BB962C8B-B14F-4D97-AF65-F5344CB8AC3E}">
+        <p14:creationId xmlns:p14="http://schemas.microsoft.com/office/powerpoint/2010/main" val="721994768"/>
+      </p:ext>
+    </p:extLst>
+  </p:cSld>
+  <p:clrMapOvr>
+    <a:masterClrMapping/>
+  </p:clrMapOvr>
+</p:sld>
+</file>
+
+<file path=ppt/slides/slide3.xml><?xml version="1.0" encoding="utf-8"?>
+<p:sld xmlns:a="http://schemas.openxmlformats.org/drawingml/2006/main" xmlns:r="http://schemas.openxmlformats.org/officeDocument/2006/relationships" xmlns:p="http://schemas.openxmlformats.org/presentationml/2006/main">
+  <p:cSld>
+    <p:spTree>
+      <p:nvGrpSpPr>
+        <p:cNvPr id="1" name=""/>
+        <p:cNvGrpSpPr/>
+        <p:nvPr/>
+      </p:nvGrpSpPr>
+      <p:grpSpPr>
+        <a:xfrm>
+          <a:off x="0" y="0"/>
+          <a:ext cx="0" cy="0"/>
+          <a:chOff x="0" y="0"/>
+          <a:chExt cx="0" cy="0"/>
+        </a:xfrm>
+      </p:grpSpPr>
+      <p:sp>
+        <p:nvSpPr>
+          <p:cNvPr id="2" name="標題 1">
+            <a:extLst>
+              <a:ext uri="{FF2B5EF4-FFF2-40B4-BE49-F238E27FC236}">
+                <a16:creationId xmlns:a16="http://schemas.microsoft.com/office/drawing/2014/main" id="{22D548C3-C68C-83FD-93FD-F44F10B5129B}"/>
+              </a:ext>
+            </a:extLst>
+          </p:cNvPr>
+          <p:cNvSpPr>
+            <a:spLocks noGrp="1"/>
+          </p:cNvSpPr>
+          <p:nvPr>
+            <p:ph type="title"/>
+          </p:nvPr>
+        </p:nvSpPr>
+        <p:spPr/>
+        <p:txBody>
+          <a:bodyPr/>
+          <a:lstStyle/>
+          <a:p>
+            <a:r>
+              <a:rPr lang="en-US" dirty="0" err="1"/>
+              <a:t>Get_move</a:t>
+            </a:r>
+            <a:endParaRPr lang="en-US" dirty="0"/>
+          </a:p>
+        </p:txBody>
+      </p:sp>
+      <p:sp>
+        <p:nvSpPr>
+          <p:cNvPr id="3" name="內容版面配置區 2">
+            <a:extLst>
+              <a:ext uri="{FF2B5EF4-FFF2-40B4-BE49-F238E27FC236}">
+                <a16:creationId xmlns:a16="http://schemas.microsoft.com/office/drawing/2014/main" id="{C82C74B3-B840-5CBE-F4E7-C445E5768BD9}"/>
+              </a:ext>
+            </a:extLst>
+          </p:cNvPr>
+          <p:cNvSpPr>
+            <a:spLocks noGrp="1"/>
+          </p:cNvSpPr>
+          <p:nvPr>
+            <p:ph idx="1"/>
+          </p:nvPr>
+        </p:nvSpPr>
+        <p:spPr/>
+        <p:txBody>
+          <a:bodyPr>
+            <a:normAutofit/>
+          </a:bodyPr>
+          <a:lstStyle/>
+          <a:p>
+            <a:r>
+              <a:rPr lang="en-US" altLang="zh-TW" sz="2400" dirty="0"/>
+              <a:t>Alpha beta, minimax </a:t>
+            </a:r>
+            <a:r>
+              <a:rPr lang="zh-TW" altLang="en-US" sz="2400" dirty="0"/>
+              <a:t>的</a:t>
+            </a:r>
+            <a:r>
+              <a:rPr lang="en-US" altLang="zh-TW" sz="2400" dirty="0" err="1"/>
+              <a:t>get_move</a:t>
+            </a:r>
+            <a:r>
+              <a:rPr lang="zh-TW" altLang="en-US" sz="2400" dirty="0"/>
+              <a:t>如下圖</a:t>
+            </a:r>
+            <a:r>
+              <a:rPr lang="en-US" altLang="zh-TW" sz="2400" dirty="0"/>
+              <a:t> </a:t>
+            </a:r>
+          </a:p>
+          <a:p>
+            <a:r>
+              <a:rPr lang="zh-TW" altLang="en-US" sz="2400" dirty="0"/>
+              <a:t>用</a:t>
+            </a:r>
+            <a:r>
+              <a:rPr lang="en-US" altLang="zh-TW" sz="2400" dirty="0"/>
+              <a:t>for</a:t>
+            </a:r>
+            <a:r>
+              <a:rPr lang="zh-TW" altLang="en-US" sz="2400" dirty="0"/>
+              <a:t>迴圈遍歷每個可能的動作，找出</a:t>
+            </a:r>
+            <a:r>
+              <a:rPr lang="en-US" altLang="zh-TW" sz="2400" dirty="0"/>
+              <a:t>state value</a:t>
+            </a:r>
+            <a:r>
+              <a:rPr lang="zh-TW" altLang="en-US" sz="2400" dirty="0"/>
+              <a:t>最大者</a:t>
+            </a:r>
+            <a:endParaRPr lang="en-US" altLang="zh-TW" sz="2400" dirty="0"/>
+          </a:p>
+          <a:p>
+            <a:r>
+              <a:rPr lang="zh-TW" altLang="en-US" sz="2400" dirty="0"/>
+              <a:t>回傳造成</a:t>
+            </a:r>
+            <a:r>
+              <a:rPr lang="en-US" altLang="zh-TW" sz="2400" dirty="0"/>
+              <a:t>state value</a:t>
+            </a:r>
+            <a:r>
+              <a:rPr lang="zh-TW" altLang="en-US" sz="2400" dirty="0"/>
+              <a:t>最大的動作</a:t>
+            </a:r>
+            <a:endParaRPr lang="en-US" sz="2400" dirty="0"/>
+          </a:p>
+        </p:txBody>
+      </p:sp>
+      <p:pic>
+        <p:nvPicPr>
+          <p:cNvPr id="5" name="圖片 4">
+            <a:extLst>
+              <a:ext uri="{FF2B5EF4-FFF2-40B4-BE49-F238E27FC236}">
+                <a16:creationId xmlns:a16="http://schemas.microsoft.com/office/drawing/2014/main" id="{722BA95A-D6C6-582F-DA17-4B2E348C4037}"/>
+              </a:ext>
+            </a:extLst>
+          </p:cNvPr>
+          <p:cNvPicPr>
+            <a:picLocks noChangeAspect="1"/>
+          </p:cNvPicPr>
+          <p:nvPr/>
+        </p:nvPicPr>
+        <p:blipFill>
+          <a:blip r:embed="rId2"/>
+          <a:stretch>
+            <a:fillRect/>
+          </a:stretch>
+        </p:blipFill>
+        <p:spPr>
+          <a:xfrm>
+            <a:off x="1323975" y="3286484"/>
+            <a:ext cx="8669092" cy="3482616"/>
+          </a:xfrm>
+          <a:prstGeom prst="rect">
+            <a:avLst/>
+          </a:prstGeom>
+        </p:spPr>
+      </p:pic>
+    </p:spTree>
+    <p:extLst>
+      <p:ext uri="{BB962C8B-B14F-4D97-AF65-F5344CB8AC3E}">
+        <p14:creationId xmlns:p14="http://schemas.microsoft.com/office/powerpoint/2010/main" val="1957876657"/>
+      </p:ext>
+    </p:extLst>
+  </p:cSld>
+  <p:clrMapOvr>
+    <a:masterClrMapping/>
+  </p:clrMapOvr>
+</p:sld>
+</file>
+
+<file path=ppt/slides/slide4.xml><?xml version="1.0" encoding="utf-8"?>
+<p:sld xmlns:a="http://schemas.openxmlformats.org/drawingml/2006/main" xmlns:r="http://schemas.openxmlformats.org/officeDocument/2006/relationships" xmlns:p="http://schemas.openxmlformats.org/presentationml/2006/main">
+  <p:cSld>
+    <p:spTree>
+      <p:nvGrpSpPr>
+        <p:cNvPr id="1" name=""/>
+        <p:cNvGrpSpPr/>
+        <p:nvPr/>
+      </p:nvGrpSpPr>
+      <p:grpSpPr>
+        <a:xfrm>
+          <a:off x="0" y="0"/>
+          <a:ext cx="0" cy="0"/>
+          <a:chOff x="0" y="0"/>
+          <a:chExt cx="0" cy="0"/>
+        </a:xfrm>
+      </p:grpSpPr>
+      <p:sp>
+        <p:nvSpPr>
+          <p:cNvPr id="2" name="標題 1">
+            <a:extLst>
+              <a:ext uri="{FF2B5EF4-FFF2-40B4-BE49-F238E27FC236}">
                 <a16:creationId xmlns:a16="http://schemas.microsoft.com/office/drawing/2014/main" id="{0335AA0C-D037-E7BA-9792-156E1126D80D}"/>
               </a:ext>
             </a:extLst>
@@ -3999,34 +4039,90 @@
             <p:ph idx="1"/>
           </p:nvPr>
         </p:nvSpPr>
-        <p:spPr/>
-        <p:txBody>
-          <a:bodyPr/>
-          <a:lstStyle/>
-          <a:p>
-            <a:r>
-              <a:rPr lang="zh-TW" altLang="en-US" dirty="0"/>
+        <p:spPr>
+          <a:xfrm>
+            <a:off x="838200" y="1825625"/>
+            <a:ext cx="4933950" cy="4351338"/>
+          </a:xfrm>
+        </p:spPr>
+        <p:txBody>
+          <a:bodyPr>
+            <a:normAutofit/>
+          </a:bodyPr>
+          <a:lstStyle/>
+          <a:p>
+            <a:r>
+              <a:rPr lang="zh-TW" altLang="en-US" sz="2400" dirty="0"/>
               <a:t>與簡報中的</a:t>
             </a:r>
             <a:r>
-              <a:rPr lang="en-US" altLang="zh-TW" dirty="0"/>
+              <a:rPr lang="en-US" altLang="zh-TW" sz="2400" dirty="0"/>
               <a:t>Pseudo Code </a:t>
             </a:r>
             <a:r>
-              <a:rPr lang="zh-TW" altLang="en-US" dirty="0"/>
+              <a:rPr lang="zh-TW" altLang="en-US" sz="2400" dirty="0"/>
               <a:t>類似，從當今情況往未來情況找</a:t>
             </a:r>
-            <a:endParaRPr lang="en-US" altLang="zh-TW" dirty="0"/>
-          </a:p>
-          <a:p>
-            <a:r>
-              <a:rPr lang="zh-TW" altLang="en-US"/>
+            <a:endParaRPr lang="en-US" altLang="zh-TW" sz="2400" dirty="0"/>
+          </a:p>
+          <a:p>
+            <a:r>
+              <a:rPr lang="zh-TW" altLang="en-US" sz="2400" dirty="0"/>
               <a:t>有三層</a:t>
             </a:r>
-            <a:endParaRPr lang="en-US" dirty="0"/>
-          </a:p>
-        </p:txBody>
-      </p:sp>
+            <a:endParaRPr lang="en-US" altLang="zh-TW" sz="2400" dirty="0"/>
+          </a:p>
+          <a:p>
+            <a:r>
+              <a:rPr lang="en-US" sz="2400" dirty="0" err="1"/>
+              <a:t>get_move</a:t>
+            </a:r>
+            <a:r>
+              <a:rPr lang="zh-TW" altLang="en-US" sz="2400" dirty="0"/>
+              <a:t>有</a:t>
+            </a:r>
+            <a:r>
+              <a:rPr lang="en-US" altLang="zh-TW" sz="2400" dirty="0" err="1"/>
+              <a:t>get_value</a:t>
+            </a:r>
+            <a:r>
+              <a:rPr lang="zh-TW" altLang="en-US" sz="2400" dirty="0"/>
+              <a:t>去取出最大值，並且套用最佳路徑</a:t>
+            </a:r>
+            <a:endParaRPr lang="en-US" sz="2400" dirty="0"/>
+          </a:p>
+        </p:txBody>
+      </p:sp>
+      <p:pic>
+        <p:nvPicPr>
+          <p:cNvPr id="5" name="圖片 4">
+            <a:extLst>
+              <a:ext uri="{FF2B5EF4-FFF2-40B4-BE49-F238E27FC236}">
+                <a16:creationId xmlns:a16="http://schemas.microsoft.com/office/drawing/2014/main" id="{1697A85A-F0F9-2309-C000-32B63D6FE03A}"/>
+              </a:ext>
+            </a:extLst>
+          </p:cNvPr>
+          <p:cNvPicPr>
+            <a:picLocks noChangeAspect="1"/>
+          </p:cNvPicPr>
+          <p:nvPr/>
+        </p:nvPicPr>
+        <p:blipFill>
+          <a:blip r:embed="rId2"/>
+          <a:stretch>
+            <a:fillRect/>
+          </a:stretch>
+        </p:blipFill>
+        <p:spPr>
+          <a:xfrm>
+            <a:off x="6215350" y="444301"/>
+            <a:ext cx="5885674" cy="5969397"/>
+          </a:xfrm>
+          <a:prstGeom prst="rect">
+            <a:avLst/>
+          </a:prstGeom>
+        </p:spPr>
+      </p:pic>
     </p:spTree>
     <p:extLst>
       <p:ext uri="{BB962C8B-B14F-4D97-AF65-F5344CB8AC3E}">
@@ -4040,10 +4136,200 @@
 </p:sld>
 </file>
 
+<file path=ppt/slides/slide5.xml><?xml version="1.0" encoding="utf-8"?>
+<p:sld xmlns:a="http://schemas.openxmlformats.org/drawingml/2006/main" xmlns:r="http://schemas.openxmlformats.org/officeDocument/2006/relationships" xmlns:p="http://schemas.openxmlformats.org/presentationml/2006/main">
+  <p:cSld>
+    <p:spTree>
+      <p:nvGrpSpPr>
+        <p:cNvPr id="1" name=""/>
+        <p:cNvGrpSpPr/>
+        <p:nvPr/>
+      </p:nvGrpSpPr>
+      <p:grpSpPr>
+        <a:xfrm>
+          <a:off x="0" y="0"/>
+          <a:ext cx="0" cy="0"/>
+          <a:chOff x="0" y="0"/>
+          <a:chExt cx="0" cy="0"/>
+        </a:xfrm>
+      </p:grpSpPr>
+      <p:sp>
+        <p:nvSpPr>
+          <p:cNvPr id="2" name="標題 1">
+            <a:extLst>
+              <a:ext uri="{FF2B5EF4-FFF2-40B4-BE49-F238E27FC236}">
+                <a16:creationId xmlns:a16="http://schemas.microsoft.com/office/drawing/2014/main" id="{633045A5-9F7D-2BF7-C54C-0B4F70409CF9}"/>
+              </a:ext>
+            </a:extLst>
+          </p:cNvPr>
+          <p:cNvSpPr>
+            <a:spLocks noGrp="1"/>
+          </p:cNvSpPr>
+          <p:nvPr>
+            <p:ph type="title"/>
+          </p:nvPr>
+        </p:nvSpPr>
+        <p:spPr/>
+        <p:txBody>
+          <a:bodyPr/>
+          <a:lstStyle/>
+          <a:p>
+            <a:r>
+              <a:rPr lang="en-US" dirty="0"/>
+              <a:t>Alpha Beta</a:t>
+            </a:r>
+          </a:p>
+        </p:txBody>
+      </p:sp>
+      <p:sp>
+        <p:nvSpPr>
+          <p:cNvPr id="3" name="內容版面配置區 2">
+            <a:extLst>
+              <a:ext uri="{FF2B5EF4-FFF2-40B4-BE49-F238E27FC236}">
+                <a16:creationId xmlns:a16="http://schemas.microsoft.com/office/drawing/2014/main" id="{3FB5090A-B17D-2CB5-970C-6BCF4C0DA674}"/>
+              </a:ext>
+            </a:extLst>
+          </p:cNvPr>
+          <p:cNvSpPr>
+            <a:spLocks noGrp="1"/>
+          </p:cNvSpPr>
+          <p:nvPr>
+            <p:ph idx="1"/>
+          </p:nvPr>
+        </p:nvSpPr>
+        <p:spPr>
+          <a:xfrm>
+            <a:off x="838200" y="1825625"/>
+            <a:ext cx="5476875" cy="4351338"/>
+          </a:xfrm>
+        </p:spPr>
+        <p:txBody>
+          <a:bodyPr>
+            <a:normAutofit/>
+          </a:bodyPr>
+          <a:lstStyle/>
+          <a:p>
+            <a:r>
+              <a:rPr lang="zh-TW" altLang="en-US" sz="2400" dirty="0"/>
+              <a:t>原理和講義中的</a:t>
+            </a:r>
+            <a:r>
+              <a:rPr lang="en-US" altLang="zh-TW" sz="2400" dirty="0"/>
+              <a:t>Pseudo code</a:t>
+            </a:r>
+            <a:r>
+              <a:rPr lang="zh-TW" altLang="en-US" sz="2400" dirty="0"/>
+              <a:t>類似</a:t>
+            </a:r>
+            <a:endParaRPr lang="en-US" altLang="zh-TW" sz="2400" dirty="0"/>
+          </a:p>
+          <a:p>
+            <a:r>
+              <a:rPr lang="zh-TW" altLang="en-US" sz="2400" dirty="0"/>
+              <a:t>有增加</a:t>
+            </a:r>
+            <a:r>
+              <a:rPr lang="en-US" altLang="zh-TW" sz="2400" dirty="0"/>
+              <a:t>map&lt;State, int&gt; visited</a:t>
+            </a:r>
+            <a:r>
+              <a:rPr lang="zh-TW" altLang="en-US" sz="2400" dirty="0"/>
+              <a:t>和</a:t>
+            </a:r>
+            <a:r>
+              <a:rPr lang="en-US" altLang="zh-TW" sz="2400" dirty="0"/>
+              <a:t>set&lt;State&gt; </a:t>
+            </a:r>
+            <a:r>
+              <a:rPr lang="en-US" altLang="zh-TW" sz="2400" dirty="0" err="1"/>
+              <a:t>ifVisited</a:t>
+            </a:r>
+            <a:r>
+              <a:rPr lang="zh-TW" altLang="en-US" sz="2400" dirty="0"/>
+              <a:t>，判斷如果有棋盤走過，就直接回傳之前算過的值，不再重算一次，節省時間</a:t>
+            </a:r>
+            <a:endParaRPr lang="en-US" altLang="zh-TW" sz="2400" dirty="0"/>
+          </a:p>
+          <a:p>
+            <a:r>
+              <a:rPr lang="en-US" sz="2400" dirty="0" err="1"/>
+              <a:t>get_move</a:t>
+            </a:r>
+            <a:r>
+              <a:rPr lang="zh-TW" altLang="en-US" sz="2400" dirty="0"/>
+              <a:t>有</a:t>
+            </a:r>
+            <a:r>
+              <a:rPr lang="en-US" altLang="zh-TW" sz="2400" dirty="0" err="1"/>
+              <a:t>get_value</a:t>
+            </a:r>
+            <a:r>
+              <a:rPr lang="zh-TW" altLang="en-US" sz="2400" dirty="0"/>
+              <a:t>去取出最大值，並且套用最佳路徑</a:t>
+            </a:r>
+            <a:endParaRPr lang="en-US" sz="2400" dirty="0"/>
+          </a:p>
+          <a:p>
+            <a:endParaRPr lang="en-US" altLang="zh-TW" sz="2400" dirty="0"/>
+          </a:p>
+          <a:p>
+            <a:pPr marL="0" indent="0">
+              <a:buNone/>
+            </a:pPr>
+            <a:endParaRPr lang="en-US" altLang="zh-TW" sz="2400" dirty="0"/>
+          </a:p>
+          <a:p>
+            <a:endParaRPr lang="en-US" sz="2400" dirty="0"/>
+          </a:p>
+        </p:txBody>
+      </p:sp>
+      <p:pic>
+        <p:nvPicPr>
+          <p:cNvPr id="5" name="圖片 4">
+            <a:extLst>
+              <a:ext uri="{FF2B5EF4-FFF2-40B4-BE49-F238E27FC236}">
+                <a16:creationId xmlns:a16="http://schemas.microsoft.com/office/drawing/2014/main" id="{7860D7EB-A191-0F1F-B11A-E0CC42299772}"/>
+              </a:ext>
+            </a:extLst>
+          </p:cNvPr>
+          <p:cNvPicPr>
+            <a:picLocks noChangeAspect="1"/>
+          </p:cNvPicPr>
+          <p:nvPr/>
+        </p:nvPicPr>
+        <p:blipFill>
+          <a:blip r:embed="rId2"/>
+          <a:stretch>
+            <a:fillRect/>
+          </a:stretch>
+        </p:blipFill>
+        <p:spPr>
+          <a:xfrm>
+            <a:off x="6522229" y="365125"/>
+            <a:ext cx="5669771" cy="6073666"/>
+          </a:xfrm>
+          <a:prstGeom prst="rect">
+            <a:avLst/>
+          </a:prstGeom>
+        </p:spPr>
+      </p:pic>
+    </p:spTree>
+    <p:extLst>
+      <p:ext uri="{BB962C8B-B14F-4D97-AF65-F5344CB8AC3E}">
+        <p14:creationId xmlns:p14="http://schemas.microsoft.com/office/powerpoint/2010/main" val="3319852141"/>
+      </p:ext>
+    </p:extLst>
+  </p:cSld>
+  <p:clrMapOvr>
+    <a:masterClrMapping/>
+  </p:clrMapOvr>
+</p:sld>
+</file>
+
 <file path=ppt/theme/theme1.xml><?xml version="1.0" encoding="utf-8"?>
-<a:theme xmlns:a="http://schemas.openxmlformats.org/drawingml/2006/main" name="裁剪">
+<a:theme xmlns:a="http://schemas.openxmlformats.org/drawingml/2006/main" name="Office 佈景主題">
   <a:themeElements>
-    <a:clrScheme name="裁剪">
+    <a:clrScheme name="Office">
       <a:dk1>
         <a:sysClr val="windowText" lastClr="000000"/>
       </a:dk1>
@@ -4051,109 +4337,49 @@
         <a:sysClr val="window" lastClr="FFFFFF"/>
       </a:lt1>
       <a:dk2>
-        <a:srgbClr val="191B0E"/>
+        <a:srgbClr val="44546A"/>
       </a:dk2>
       <a:lt2>
-        <a:srgbClr val="EFEDE3"/>
+        <a:srgbClr val="E7E6E6"/>
       </a:lt2>
       <a:accent1>
-        <a:srgbClr val="8C8D86"/>
+        <a:srgbClr val="4472C4"/>
       </a:accent1>
       <a:accent2>
-        <a:srgbClr val="E6C069"/>
+        <a:srgbClr val="ED7D31"/>
       </a:accent2>
       <a:accent3>
-        <a:srgbClr val="897B61"/>
+        <a:srgbClr val="A5A5A5"/>
       </a:accent3>
       <a:accent4>
-        <a:srgbClr val="8DAB8E"/>
+        <a:srgbClr val="FFC000"/>
       </a:accent4>
       <a:accent5>
-        <a:srgbClr val="77A2BB"/>
+        <a:srgbClr val="5B9BD5"/>
       </a:accent5>
       <a:accent6>
-        <a:srgbClr val="E28394"/>
+        <a:srgbClr val="70AD47"/>
       </a:accent6>
       <a:hlink>
-        <a:srgbClr val="77A2BB"/>
+        <a:srgbClr val="0563C1"/>
       </a:hlink>
       <a:folHlink>
-        <a:srgbClr val="957A99"/>
+        <a:srgbClr val="954F72"/>
       </a:folHlink>
     </a:clrScheme>
-    <a:fontScheme name="裁剪">
+    <a:fontScheme name="自訂 2">
       <a:majorFont>
-        <a:latin typeface="Franklin Gothic Book" panose="020B0503020102020204"/>
-        <a:ea typeface=""/>
+        <a:latin typeface="Consolas"/>
+        <a:ea typeface="Noto Sans TC"/>
         <a:cs typeface=""/>
-        <a:font script="Jpan" typeface="メイリオ"/>
-        <a:font script="Hang" typeface="돋움"/>
-        <a:font script="Hans" typeface="华文楷体"/>
-        <a:font script="Hant" typeface="微軟正黑體"/>
-        <a:font script="Arab" typeface="Tahoma"/>
-        <a:font script="Hebr" typeface="Aharoni"/>
-        <a:font script="Thai" typeface="LilyUPC"/>
-        <a:font script="Ethi" typeface="Nyala"/>
-        <a:font script="Beng" typeface="Vrinda"/>
-        <a:font script="Gujr" typeface="Shruti"/>
-        <a:font script="Khmr" typeface="DaunPenh"/>
-        <a:font script="Knda" typeface="Tunga"/>
-        <a:font script="Guru" typeface="Raavi"/>
-        <a:font script="Cans" typeface="Euphemia"/>
-        <a:font script="Cher" typeface="Plantagenet Cherokee"/>
-        <a:font script="Yiii" typeface="Microsoft Yi Baiti"/>
-        <a:font script="Tibt" typeface="Microsoft Himalaya"/>
-        <a:font script="Thaa" typeface="MV Boli"/>
-        <a:font script="Deva" typeface="Mangal"/>
-        <a:font script="Telu" typeface="Gautami"/>
-        <a:font script="Taml" typeface="Latha"/>
-        <a:font script="Syrc" typeface="Estrangelo Edessa"/>
-        <a:font script="Orya" typeface="Kalinga"/>
-        <a:font script="Mlym" typeface="Kartika"/>
-        <a:font script="Laoo" typeface="DokChampa"/>
-        <a:font script="Sinh" typeface="Iskoola Pota"/>
-        <a:font script="Mong" typeface="Mongolian Baiti"/>
-        <a:font script="Viet" typeface="Tahoma"/>
-        <a:font script="Uigh" typeface="Microsoft Uighur"/>
-        <a:font script="Geor" typeface="Sylfaen"/>
       </a:majorFont>
       <a:minorFont>
-        <a:latin typeface="Franklin Gothic Book" panose="020B0503020102020204"/>
-        <a:ea typeface=""/>
+        <a:latin typeface="Verdana"/>
+        <a:ea typeface="Noto Sans TC"/>
         <a:cs typeface=""/>
-        <a:font script="Jpan" typeface="メイリオ"/>
-        <a:font script="Hang" typeface="돋움"/>
-        <a:font script="Hans" typeface="华文楷体"/>
-        <a:font script="Hant" typeface="微軟正黑體"/>
-        <a:font script="Arab" typeface="Tahoma"/>
-        <a:font script="Hebr" typeface="Aharoni"/>
-        <a:font script="Thai" typeface="LilyUPC"/>
-        <a:font script="Ethi" typeface="Nyala"/>
-        <a:font script="Beng" typeface="Vrinda"/>
-        <a:font script="Gujr" typeface="Shruti"/>
-        <a:font script="Khmr" typeface="DaunPenh"/>
-        <a:font script="Knda" typeface="Tunga"/>
-        <a:font script="Guru" typeface="Raavi"/>
-        <a:font script="Cans" typeface="Euphemia"/>
-        <a:font script="Cher" typeface="Plantagenet Cherokee"/>
-        <a:font script="Yiii" typeface="Microsoft Yi Baiti"/>
-        <a:font script="Tibt" typeface="Microsoft Himalaya"/>
-        <a:font script="Thaa" typeface="MV Boli"/>
-        <a:font script="Deva" typeface="Mangal"/>
-        <a:font script="Telu" typeface="Gautami"/>
-        <a:font script="Taml" typeface="Latha"/>
-        <a:font script="Syrc" typeface="Estrangelo Edessa"/>
-        <a:font script="Orya" typeface="Kalinga"/>
-        <a:font script="Mlym" typeface="Kartika"/>
-        <a:font script="Laoo" typeface="DokChampa"/>
-        <a:font script="Sinh" typeface="Iskoola Pota"/>
-        <a:font script="Mong" typeface="Mongolian Baiti"/>
-        <a:font script="Viet" typeface="Tahoma"/>
-        <a:font script="Uigh" typeface="Microsoft Uighur"/>
-        <a:font script="Geor" typeface="Sylfaen"/>
       </a:minorFont>
     </a:fontScheme>
-    <a:fmtScheme name="裁剪">
+    <a:fmtScheme name="Office">
       <a:fillStyleLst>
         <a:solidFill>
           <a:schemeClr val="phClr"/>
@@ -4162,23 +4388,23 @@
           <a:gsLst>
             <a:gs pos="0">
               <a:schemeClr val="phClr">
+                <a:lumMod val="110000"/>
+                <a:satMod val="105000"/>
                 <a:tint val="67000"/>
-                <a:satMod val="105000"/>
-                <a:lumMod val="110000"/>
               </a:schemeClr>
             </a:gs>
             <a:gs pos="50000">
               <a:schemeClr val="phClr">
+                <a:lumMod val="105000"/>
+                <a:satMod val="103000"/>
                 <a:tint val="73000"/>
-                <a:satMod val="103000"/>
-                <a:lumMod val="105000"/>
               </a:schemeClr>
             </a:gs>
             <a:gs pos="100000">
               <a:schemeClr val="phClr">
+                <a:lumMod val="105000"/>
+                <a:satMod val="109000"/>
                 <a:tint val="81000"/>
-                <a:satMod val="109000"/>
-                <a:lumMod val="105000"/>
               </a:schemeClr>
             </a:gs>
           </a:gsLst>
@@ -4188,23 +4414,23 @@
           <a:gsLst>
             <a:gs pos="0">
               <a:schemeClr val="phClr">
-                <a:tint val="94000"/>
                 <a:satMod val="103000"/>
                 <a:lumMod val="102000"/>
+                <a:tint val="94000"/>
               </a:schemeClr>
             </a:gs>
             <a:gs pos="50000">
               <a:schemeClr val="phClr">
-                <a:shade val="100000"/>
                 <a:satMod val="110000"/>
                 <a:lumMod val="100000"/>
+                <a:shade val="100000"/>
               </a:schemeClr>
             </a:gs>
             <a:gs pos="100000">
               <a:schemeClr val="phClr">
+                <a:lumMod val="99000"/>
+                <a:satMod val="120000"/>
                 <a:shade val="78000"/>
-                <a:satMod val="120000"/>
-                <a:lumMod val="99000"/>
               </a:schemeClr>
             </a:gs>
           </a:gsLst>
@@ -4212,23 +4438,26 @@
         </a:gradFill>
       </a:fillStyleLst>
       <a:lnStyleLst>
-        <a:ln w="6350" cap="flat" cmpd="sng" algn="in">
+        <a:ln w="6350" cap="flat" cmpd="sng" algn="ctr">
           <a:solidFill>
             <a:schemeClr val="phClr"/>
           </a:solidFill>
           <a:prstDash val="solid"/>
+          <a:miter lim="800000"/>
         </a:ln>
-        <a:ln w="34925" cap="flat" cmpd="sng" algn="in">
+        <a:ln w="12700" cap="flat" cmpd="sng" algn="ctr">
           <a:solidFill>
             <a:schemeClr val="phClr"/>
           </a:solidFill>
           <a:prstDash val="solid"/>
+          <a:miter lim="800000"/>
         </a:ln>
-        <a:ln w="19050" cap="flat" cmpd="sng" algn="in">
+        <a:ln w="19050" cap="flat" cmpd="sng" algn="ctr">
           <a:solidFill>
             <a:schemeClr val="phClr"/>
           </a:solidFill>
           <a:prstDash val="solid"/>
+          <a:miter lim="800000"/>
         </a:ln>
       </a:lnStyleLst>
       <a:effectStyleLst>
@@ -4242,7 +4471,7 @@
           <a:effectLst>
             <a:outerShdw blurRad="57150" dist="19050" dir="5400000" algn="ctr" rotWithShape="0">
               <a:srgbClr val="000000">
-                <a:alpha val="35000"/>
+                <a:alpha val="63000"/>
               </a:srgbClr>
             </a:outerShdw>
           </a:effectLst>
@@ -4263,16 +4492,16 @@
             <a:gs pos="0">
               <a:schemeClr val="phClr">
                 <a:tint val="93000"/>
+                <a:satMod val="150000"/>
                 <a:shade val="98000"/>
-                <a:satMod val="150000"/>
                 <a:lumMod val="102000"/>
               </a:schemeClr>
             </a:gs>
             <a:gs pos="50000">
               <a:schemeClr val="phClr">
                 <a:tint val="98000"/>
+                <a:satMod val="130000"/>
                 <a:shade val="90000"/>
-                <a:satMod val="130000"/>
                 <a:lumMod val="103000"/>
               </a:schemeClr>
             </a:gs>
@@ -4292,7 +4521,7 @@
   <a:extraClrSchemeLst/>
   <a:extLst>
     <a:ext uri="{05A4C25C-085E-4340-85A3-A5531E510DB2}">
-      <thm15:themeFamily xmlns:thm15="http://schemas.microsoft.com/office/thememl/2012/main" name="Crop" id="{EC9488ED-E761-4D60-9AC4-764D1FE2C171}" vid="{CE19780C-D67D-4C13-9DE9-A52BC3BA51B4}"/>
+      <thm15:themeFamily xmlns:thm15="http://schemas.microsoft.com/office/thememl/2012/main" name="Office Theme" id="{62F939B6-93AF-4DB8-9C6B-D6C7DFDC589F}" vid="{4A3C46E8-61CC-4603-A589-7422A47A8E4A}"/>
     </a:ext>
   </a:extLst>
 </a:theme>

</xml_diff>